<commit_message>
Updated slide deck with July's meeting info
</commit_message>
<xml_diff>
--- a/doc/Cross-Platform with Xamarin.pptx
+++ b/doc/Cross-Platform with Xamarin.pptx
@@ -8,7 +8,7 @@
     <p:sldMasterId id="2147483799" r:id="rId4"/>
   </p:sldMasterIdLst>
   <p:notesMasterIdLst>
-    <p:notesMasterId r:id="rId32"/>
+    <p:notesMasterId r:id="rId36"/>
   </p:notesMasterIdLst>
   <p:sldIdLst>
     <p:sldId id="521" r:id="rId5"/>
@@ -24,20 +24,24 @@
     <p:sldId id="430" r:id="rId15"/>
     <p:sldId id="525" r:id="rId16"/>
     <p:sldId id="538" r:id="rId17"/>
-    <p:sldId id="539" r:id="rId18"/>
-    <p:sldId id="540" r:id="rId19"/>
-    <p:sldId id="541" r:id="rId20"/>
-    <p:sldId id="528" r:id="rId21"/>
-    <p:sldId id="529" r:id="rId22"/>
-    <p:sldId id="542" r:id="rId23"/>
-    <p:sldId id="530" r:id="rId24"/>
-    <p:sldId id="526" r:id="rId25"/>
-    <p:sldId id="429" r:id="rId26"/>
-    <p:sldId id="524" r:id="rId27"/>
-    <p:sldId id="523" r:id="rId28"/>
-    <p:sldId id="531" r:id="rId29"/>
-    <p:sldId id="306" r:id="rId30"/>
-    <p:sldId id="520" r:id="rId31"/>
+    <p:sldId id="543" r:id="rId18"/>
+    <p:sldId id="539" r:id="rId19"/>
+    <p:sldId id="544" r:id="rId20"/>
+    <p:sldId id="540" r:id="rId21"/>
+    <p:sldId id="545" r:id="rId22"/>
+    <p:sldId id="541" r:id="rId23"/>
+    <p:sldId id="546" r:id="rId24"/>
+    <p:sldId id="528" r:id="rId25"/>
+    <p:sldId id="529" r:id="rId26"/>
+    <p:sldId id="542" r:id="rId27"/>
+    <p:sldId id="530" r:id="rId28"/>
+    <p:sldId id="526" r:id="rId29"/>
+    <p:sldId id="429" r:id="rId30"/>
+    <p:sldId id="524" r:id="rId31"/>
+    <p:sldId id="523" r:id="rId32"/>
+    <p:sldId id="531" r:id="rId33"/>
+    <p:sldId id="306" r:id="rId34"/>
+    <p:sldId id="520" r:id="rId35"/>
   </p:sldIdLst>
   <p:sldSz cx="12192000" cy="6858000"/>
   <p:notesSz cx="6858000" cy="9144000"/>
@@ -162,9 +166,13 @@
             <p14:sldId id="430"/>
             <p14:sldId id="525"/>
             <p14:sldId id="538"/>
+            <p14:sldId id="543"/>
             <p14:sldId id="539"/>
+            <p14:sldId id="544"/>
             <p14:sldId id="540"/>
+            <p14:sldId id="545"/>
             <p14:sldId id="541"/>
+            <p14:sldId id="546"/>
             <p14:sldId id="528"/>
             <p14:sldId id="529"/>
             <p14:sldId id="542"/>
@@ -280,7 +288,7 @@
           <a:p>
             <a:fld id="{C2EF835B-0F67-453C-8965-E8369D081078}" type="datetimeFigureOut">
               <a:rPr lang="en-US" smtClean="0"/>
-              <a:t>6/7/2015</a:t>
+              <a:t>6/8/15</a:t>
             </a:fld>
             <a:endParaRPr lang="en-US"/>
           </a:p>
@@ -613,7 +621,7 @@
           <a:p>
             <a:fld id="{06A1D164-B33D-4403-8B09-EB3C0309BC7D}" type="datetime1">
               <a:rPr lang="en-US" smtClean="0"/>
-              <a:t>6/7/2015</a:t>
+              <a:t>6/8/15</a:t>
             </a:fld>
             <a:endParaRPr lang="en-US" dirty="0"/>
           </a:p>
@@ -1104,7 +1112,7 @@
     </p:spTree>
     <p:extLst>
       <p:ext uri="{BB962C8B-B14F-4D97-AF65-F5344CB8AC3E}">
-        <p14:creationId xmlns:p14="http://schemas.microsoft.com/office/powerpoint/2010/main" val="1518928267"/>
+        <p14:creationId xmlns:p14="http://schemas.microsoft.com/office/powerpoint/2010/main" val="2667380845"/>
       </p:ext>
     </p:extLst>
   </p:cSld>
@@ -1188,7 +1196,7 @@
     </p:spTree>
     <p:extLst>
       <p:ext uri="{BB962C8B-B14F-4D97-AF65-F5344CB8AC3E}">
-        <p14:creationId xmlns:p14="http://schemas.microsoft.com/office/powerpoint/2010/main" val="909587592"/>
+        <p14:creationId xmlns:p14="http://schemas.microsoft.com/office/powerpoint/2010/main" val="1518928267"/>
       </p:ext>
     </p:extLst>
   </p:cSld>
@@ -1272,7 +1280,7 @@
     </p:spTree>
     <p:extLst>
       <p:ext uri="{BB962C8B-B14F-4D97-AF65-F5344CB8AC3E}">
-        <p14:creationId xmlns:p14="http://schemas.microsoft.com/office/powerpoint/2010/main" val="3671373589"/>
+        <p14:creationId xmlns:p14="http://schemas.microsoft.com/office/powerpoint/2010/main" val="3920083035"/>
       </p:ext>
     </p:extLst>
   </p:cSld>
@@ -1356,7 +1364,7 @@
     </p:spTree>
     <p:extLst>
       <p:ext uri="{BB962C8B-B14F-4D97-AF65-F5344CB8AC3E}">
-        <p14:creationId xmlns:p14="http://schemas.microsoft.com/office/powerpoint/2010/main" val="4014753616"/>
+        <p14:creationId xmlns:p14="http://schemas.microsoft.com/office/powerpoint/2010/main" val="909587592"/>
       </p:ext>
     </p:extLst>
   </p:cSld>
@@ -1440,7 +1448,7 @@
     </p:spTree>
     <p:extLst>
       <p:ext uri="{BB962C8B-B14F-4D97-AF65-F5344CB8AC3E}">
-        <p14:creationId xmlns:p14="http://schemas.microsoft.com/office/powerpoint/2010/main" val="3188204801"/>
+        <p14:creationId xmlns:p14="http://schemas.microsoft.com/office/powerpoint/2010/main" val="4097952770"/>
       </p:ext>
     </p:extLst>
   </p:cSld>
@@ -1524,7 +1532,7 @@
     </p:spTree>
     <p:extLst>
       <p:ext uri="{BB962C8B-B14F-4D97-AF65-F5344CB8AC3E}">
-        <p14:creationId xmlns:p14="http://schemas.microsoft.com/office/powerpoint/2010/main" val="1857012932"/>
+        <p14:creationId xmlns:p14="http://schemas.microsoft.com/office/powerpoint/2010/main" val="3671373589"/>
       </p:ext>
     </p:extLst>
   </p:cSld>
@@ -1692,7 +1700,7 @@
     </p:spTree>
     <p:extLst>
       <p:ext uri="{BB962C8B-B14F-4D97-AF65-F5344CB8AC3E}">
-        <p14:creationId xmlns:p14="http://schemas.microsoft.com/office/powerpoint/2010/main" val="597409022"/>
+        <p14:creationId xmlns:p14="http://schemas.microsoft.com/office/powerpoint/2010/main" val="434924020"/>
       </p:ext>
     </p:extLst>
   </p:cSld>
@@ -1776,7 +1784,7 @@
     </p:spTree>
     <p:extLst>
       <p:ext uri="{BB962C8B-B14F-4D97-AF65-F5344CB8AC3E}">
-        <p14:creationId xmlns:p14="http://schemas.microsoft.com/office/powerpoint/2010/main" val="827446280"/>
+        <p14:creationId xmlns:p14="http://schemas.microsoft.com/office/powerpoint/2010/main" val="4014753616"/>
       </p:ext>
     </p:extLst>
   </p:cSld>
@@ -1830,33 +1838,7 @@
           <a:bodyPr/>
           <a:lstStyle/>
           <a:p>
-            <a:r>
-              <a:rPr lang="en-US" dirty="0" smtClean="0"/>
-              <a:t>Template:</a:t>
-            </a:r>
-            <a:r>
-              <a:rPr lang="en-US" baseline="0" dirty="0" smtClean="0"/>
-              <a:t>  </a:t>
-            </a:r>
-            <a:r>
-              <a:rPr lang="en-US" sz="1200" b="1" i="0" kern="1200" dirty="0" smtClean="0">
-                <a:solidFill>
-                  <a:schemeClr val="tx1"/>
-                </a:solidFill>
-                <a:effectLst/>
-                <a:latin typeface="+mn-lt"/>
-                <a:ea typeface="+mn-ea"/>
-                <a:cs typeface="+mn-cs"/>
-              </a:rPr>
-              <a:t>201-2-vms-loadbalancer-lbrules</a:t>
-            </a:r>
-          </a:p>
-          <a:p>
-            <a:r>
-              <a:rPr lang="en-US" dirty="0" smtClean="0"/>
-              <a:t>https://github.com/Azure/azure-quickstart-templates/tree/master/201-2-vms-loadbalancer-lbrules</a:t>
-            </a:r>
-            <a:endParaRPr lang="en-US" dirty="0"/>
+            <a:endParaRPr lang="en-US"/>
           </a:p>
         </p:txBody>
       </p:sp>
@@ -1886,7 +1868,7 @@
     </p:spTree>
     <p:extLst>
       <p:ext uri="{BB962C8B-B14F-4D97-AF65-F5344CB8AC3E}">
-        <p14:creationId xmlns:p14="http://schemas.microsoft.com/office/powerpoint/2010/main" val="918507906"/>
+        <p14:creationId xmlns:p14="http://schemas.microsoft.com/office/powerpoint/2010/main" val="3188204801"/>
       </p:ext>
     </p:extLst>
   </p:cSld>
@@ -1940,33 +1922,7 @@
           <a:bodyPr/>
           <a:lstStyle/>
           <a:p>
-            <a:r>
-              <a:rPr lang="en-US" dirty="0" smtClean="0"/>
-              <a:t>Template:</a:t>
-            </a:r>
-            <a:r>
-              <a:rPr lang="en-US" baseline="0" dirty="0" smtClean="0"/>
-              <a:t>  </a:t>
-            </a:r>
-            <a:r>
-              <a:rPr lang="en-US" sz="1200" b="1" i="0" kern="1200" dirty="0" smtClean="0">
-                <a:solidFill>
-                  <a:schemeClr val="tx1"/>
-                </a:solidFill>
-                <a:effectLst/>
-                <a:latin typeface="+mn-lt"/>
-                <a:ea typeface="+mn-ea"/>
-                <a:cs typeface="+mn-cs"/>
-              </a:rPr>
-              <a:t>201-2-vms-loadbalancer-lbrules</a:t>
-            </a:r>
-          </a:p>
-          <a:p>
-            <a:r>
-              <a:rPr lang="en-US" dirty="0" smtClean="0"/>
-              <a:t>https://github.com/Azure/azure-quickstart-templates/tree/master/201-2-vms-loadbalancer-lbrules</a:t>
-            </a:r>
-            <a:endParaRPr lang="en-US" dirty="0"/>
+            <a:endParaRPr lang="en-US"/>
           </a:p>
         </p:txBody>
       </p:sp>
@@ -1996,7 +1952,7 @@
     </p:spTree>
     <p:extLst>
       <p:ext uri="{BB962C8B-B14F-4D97-AF65-F5344CB8AC3E}">
-        <p14:creationId xmlns:p14="http://schemas.microsoft.com/office/powerpoint/2010/main" val="1618118643"/>
+        <p14:creationId xmlns:p14="http://schemas.microsoft.com/office/powerpoint/2010/main" val="1857012932"/>
       </p:ext>
     </p:extLst>
   </p:cSld>
@@ -2050,33 +2006,7 @@
           <a:bodyPr/>
           <a:lstStyle/>
           <a:p>
-            <a:r>
-              <a:rPr lang="en-US" dirty="0" smtClean="0"/>
-              <a:t>Template:</a:t>
-            </a:r>
-            <a:r>
-              <a:rPr lang="en-US" baseline="0" dirty="0" smtClean="0"/>
-              <a:t>  </a:t>
-            </a:r>
-            <a:r>
-              <a:rPr lang="en-US" sz="1200" b="1" i="0" kern="1200" dirty="0" smtClean="0">
-                <a:solidFill>
-                  <a:schemeClr val="tx1"/>
-                </a:solidFill>
-                <a:effectLst/>
-                <a:latin typeface="+mn-lt"/>
-                <a:ea typeface="+mn-ea"/>
-                <a:cs typeface="+mn-cs"/>
-              </a:rPr>
-              <a:t>201-2-vms-loadbalancer-lbrules</a:t>
-            </a:r>
-          </a:p>
-          <a:p>
-            <a:r>
-              <a:rPr lang="en-US" dirty="0" smtClean="0"/>
-              <a:t>https://github.com/Azure/azure-quickstart-templates/tree/master/201-2-vms-loadbalancer-lbrules</a:t>
-            </a:r>
-            <a:endParaRPr lang="en-US" dirty="0"/>
+            <a:endParaRPr lang="en-US"/>
           </a:p>
         </p:txBody>
       </p:sp>
@@ -2106,7 +2036,7 @@
     </p:spTree>
     <p:extLst>
       <p:ext uri="{BB962C8B-B14F-4D97-AF65-F5344CB8AC3E}">
-        <p14:creationId xmlns:p14="http://schemas.microsoft.com/office/powerpoint/2010/main" val="3061244098"/>
+        <p14:creationId xmlns:p14="http://schemas.microsoft.com/office/powerpoint/2010/main" val="597409022"/>
       </p:ext>
     </p:extLst>
   </p:cSld>
@@ -2160,7 +2090,7 @@
           <a:bodyPr/>
           <a:lstStyle/>
           <a:p>
-            <a:endParaRPr lang="en-US" dirty="0"/>
+            <a:endParaRPr lang="en-US"/>
           </a:p>
         </p:txBody>
       </p:sp>
@@ -2181,7 +2111,7 @@
           <a:p>
             <a:fld id="{3505E63B-9069-4A7B-94A1-6BD92A894BE1}" type="slidenum">
               <a:rPr lang="en-US" smtClean="0"/>
-              <a:t>26</a:t>
+              <a:t>25</a:t>
             </a:fld>
             <a:endParaRPr lang="en-US"/>
           </a:p>
@@ -2190,7 +2120,7 @@
     </p:spTree>
     <p:extLst>
       <p:ext uri="{BB962C8B-B14F-4D97-AF65-F5344CB8AC3E}">
-        <p14:creationId xmlns:p14="http://schemas.microsoft.com/office/powerpoint/2010/main" val="4130027731"/>
+        <p14:creationId xmlns:p14="http://schemas.microsoft.com/office/powerpoint/2010/main" val="827446280"/>
       </p:ext>
     </p:extLst>
   </p:cSld>
@@ -2244,7 +2174,143 @@
           <a:bodyPr/>
           <a:lstStyle/>
           <a:p>
+            <a:r>
+              <a:rPr lang="en-US" dirty="0" smtClean="0"/>
+              <a:t>Template:</a:t>
+            </a:r>
+            <a:r>
+              <a:rPr lang="en-US" baseline="0" dirty="0" smtClean="0"/>
+              <a:t>  </a:t>
+            </a:r>
+            <a:r>
+              <a:rPr lang="en-US" sz="1200" b="1" i="0" kern="1200" dirty="0" smtClean="0">
+                <a:solidFill>
+                  <a:schemeClr val="tx1"/>
+                </a:solidFill>
+                <a:effectLst/>
+                <a:latin typeface="+mn-lt"/>
+                <a:ea typeface="+mn-ea"/>
+                <a:cs typeface="+mn-cs"/>
+              </a:rPr>
+              <a:t>201-2-vms-loadbalancer-lbrules</a:t>
+            </a:r>
+          </a:p>
+          <a:p>
+            <a:r>
+              <a:rPr lang="en-US" dirty="0" smtClean="0"/>
+              <a:t>https://github.com/Azure/azure-quickstart-templates/tree/master/201-2-vms-loadbalancer-lbrules</a:t>
+            </a:r>
+            <a:endParaRPr lang="en-US" dirty="0"/>
+          </a:p>
+        </p:txBody>
+      </p:sp>
+      <p:sp>
+        <p:nvSpPr>
+          <p:cNvPr id="4" name="Slide Number Placeholder 3"/>
+          <p:cNvSpPr>
+            <a:spLocks noGrp="1"/>
+          </p:cNvSpPr>
+          <p:nvPr>
+            <p:ph type="sldNum" sz="quarter" idx="10"/>
+          </p:nvPr>
+        </p:nvSpPr>
+        <p:spPr/>
+        <p:txBody>
+          <a:bodyPr/>
+          <a:lstStyle/>
+          <a:p>
+            <a:fld id="{3505E63B-9069-4A7B-94A1-6BD92A894BE1}" type="slidenum">
+              <a:rPr lang="en-US" smtClean="0"/>
+              <a:t>26</a:t>
+            </a:fld>
             <a:endParaRPr lang="en-US"/>
+          </a:p>
+        </p:txBody>
+      </p:sp>
+    </p:spTree>
+    <p:extLst>
+      <p:ext uri="{BB962C8B-B14F-4D97-AF65-F5344CB8AC3E}">
+        <p14:creationId xmlns:p14="http://schemas.microsoft.com/office/powerpoint/2010/main" val="918507906"/>
+      </p:ext>
+    </p:extLst>
+  </p:cSld>
+  <p:clrMapOvr>
+    <a:masterClrMapping/>
+  </p:clrMapOvr>
+</p:notes>
+</file>
+
+<file path=ppt/notesSlides/notesSlide27.xml><?xml version="1.0" encoding="utf-8"?>
+<p:notes xmlns:a="http://schemas.openxmlformats.org/drawingml/2006/main" xmlns:r="http://schemas.openxmlformats.org/officeDocument/2006/relationships" xmlns:p="http://schemas.openxmlformats.org/presentationml/2006/main">
+  <p:cSld>
+    <p:spTree>
+      <p:nvGrpSpPr>
+        <p:cNvPr id="1" name=""/>
+        <p:cNvGrpSpPr/>
+        <p:nvPr/>
+      </p:nvGrpSpPr>
+      <p:grpSpPr>
+        <a:xfrm>
+          <a:off x="0" y="0"/>
+          <a:ext cx="0" cy="0"/>
+          <a:chOff x="0" y="0"/>
+          <a:chExt cx="0" cy="0"/>
+        </a:xfrm>
+      </p:grpSpPr>
+      <p:sp>
+        <p:nvSpPr>
+          <p:cNvPr id="2" name="Slide Image Placeholder 1"/>
+          <p:cNvSpPr>
+            <a:spLocks noGrp="1" noRot="1" noChangeAspect="1"/>
+          </p:cNvSpPr>
+          <p:nvPr>
+            <p:ph type="sldImg"/>
+          </p:nvPr>
+        </p:nvSpPr>
+        <p:spPr/>
+      </p:sp>
+      <p:sp>
+        <p:nvSpPr>
+          <p:cNvPr id="3" name="Notes Placeholder 2"/>
+          <p:cNvSpPr>
+            <a:spLocks noGrp="1"/>
+          </p:cNvSpPr>
+          <p:nvPr>
+            <p:ph type="body" idx="1"/>
+          </p:nvPr>
+        </p:nvSpPr>
+        <p:spPr/>
+        <p:txBody>
+          <a:bodyPr/>
+          <a:lstStyle/>
+          <a:p>
+            <a:r>
+              <a:rPr lang="en-US" dirty="0" smtClean="0"/>
+              <a:t>Template:</a:t>
+            </a:r>
+            <a:r>
+              <a:rPr lang="en-US" baseline="0" dirty="0" smtClean="0"/>
+              <a:t>  </a:t>
+            </a:r>
+            <a:r>
+              <a:rPr lang="en-US" sz="1200" b="1" i="0" kern="1200" dirty="0" smtClean="0">
+                <a:solidFill>
+                  <a:schemeClr val="tx1"/>
+                </a:solidFill>
+                <a:effectLst/>
+                <a:latin typeface="+mn-lt"/>
+                <a:ea typeface="+mn-ea"/>
+                <a:cs typeface="+mn-cs"/>
+              </a:rPr>
+              <a:t>201-2-vms-loadbalancer-lbrules</a:t>
+            </a:r>
+          </a:p>
+          <a:p>
+            <a:r>
+              <a:rPr lang="en-US" dirty="0" smtClean="0"/>
+              <a:t>https://github.com/Azure/azure-quickstart-templates/tree/master/201-2-vms-loadbalancer-lbrules</a:t>
+            </a:r>
+            <a:endParaRPr lang="en-US" dirty="0"/>
           </a:p>
         </p:txBody>
       </p:sp>
@@ -2274,7 +2340,201 @@
     </p:spTree>
     <p:extLst>
       <p:ext uri="{BB962C8B-B14F-4D97-AF65-F5344CB8AC3E}">
-        <p14:creationId xmlns:p14="http://schemas.microsoft.com/office/powerpoint/2010/main" val="4097674902"/>
+        <p14:creationId xmlns:p14="http://schemas.microsoft.com/office/powerpoint/2010/main" val="1618118643"/>
+      </p:ext>
+    </p:extLst>
+  </p:cSld>
+  <p:clrMapOvr>
+    <a:masterClrMapping/>
+  </p:clrMapOvr>
+</p:notes>
+</file>
+
+<file path=ppt/notesSlides/notesSlide28.xml><?xml version="1.0" encoding="utf-8"?>
+<p:notes xmlns:a="http://schemas.openxmlformats.org/drawingml/2006/main" xmlns:r="http://schemas.openxmlformats.org/officeDocument/2006/relationships" xmlns:p="http://schemas.openxmlformats.org/presentationml/2006/main">
+  <p:cSld>
+    <p:spTree>
+      <p:nvGrpSpPr>
+        <p:cNvPr id="1" name=""/>
+        <p:cNvGrpSpPr/>
+        <p:nvPr/>
+      </p:nvGrpSpPr>
+      <p:grpSpPr>
+        <a:xfrm>
+          <a:off x="0" y="0"/>
+          <a:ext cx="0" cy="0"/>
+          <a:chOff x="0" y="0"/>
+          <a:chExt cx="0" cy="0"/>
+        </a:xfrm>
+      </p:grpSpPr>
+      <p:sp>
+        <p:nvSpPr>
+          <p:cNvPr id="2" name="Slide Image Placeholder 1"/>
+          <p:cNvSpPr>
+            <a:spLocks noGrp="1" noRot="1" noChangeAspect="1"/>
+          </p:cNvSpPr>
+          <p:nvPr>
+            <p:ph type="sldImg"/>
+          </p:nvPr>
+        </p:nvSpPr>
+        <p:spPr/>
+      </p:sp>
+      <p:sp>
+        <p:nvSpPr>
+          <p:cNvPr id="3" name="Notes Placeholder 2"/>
+          <p:cNvSpPr>
+            <a:spLocks noGrp="1"/>
+          </p:cNvSpPr>
+          <p:nvPr>
+            <p:ph type="body" idx="1"/>
+          </p:nvPr>
+        </p:nvSpPr>
+        <p:spPr/>
+        <p:txBody>
+          <a:bodyPr/>
+          <a:lstStyle/>
+          <a:p>
+            <a:r>
+              <a:rPr lang="en-US" dirty="0" smtClean="0"/>
+              <a:t>Template:</a:t>
+            </a:r>
+            <a:r>
+              <a:rPr lang="en-US" baseline="0" dirty="0" smtClean="0"/>
+              <a:t>  </a:t>
+            </a:r>
+            <a:r>
+              <a:rPr lang="en-US" sz="1200" b="1" i="0" kern="1200" dirty="0" smtClean="0">
+                <a:solidFill>
+                  <a:schemeClr val="tx1"/>
+                </a:solidFill>
+                <a:effectLst/>
+                <a:latin typeface="+mn-lt"/>
+                <a:ea typeface="+mn-ea"/>
+                <a:cs typeface="+mn-cs"/>
+              </a:rPr>
+              <a:t>201-2-vms-loadbalancer-lbrules</a:t>
+            </a:r>
+          </a:p>
+          <a:p>
+            <a:r>
+              <a:rPr lang="en-US" dirty="0" smtClean="0"/>
+              <a:t>https://github.com/Azure/azure-quickstart-templates/tree/master/201-2-vms-loadbalancer-lbrules</a:t>
+            </a:r>
+            <a:endParaRPr lang="en-US" dirty="0"/>
+          </a:p>
+        </p:txBody>
+      </p:sp>
+      <p:sp>
+        <p:nvSpPr>
+          <p:cNvPr id="4" name="Slide Number Placeholder 3"/>
+          <p:cNvSpPr>
+            <a:spLocks noGrp="1"/>
+          </p:cNvSpPr>
+          <p:nvPr>
+            <p:ph type="sldNum" sz="quarter" idx="10"/>
+          </p:nvPr>
+        </p:nvSpPr>
+        <p:spPr/>
+        <p:txBody>
+          <a:bodyPr/>
+          <a:lstStyle/>
+          <a:p>
+            <a:fld id="{3505E63B-9069-4A7B-94A1-6BD92A894BE1}" type="slidenum">
+              <a:rPr lang="en-US" smtClean="0"/>
+              <a:t>28</a:t>
+            </a:fld>
+            <a:endParaRPr lang="en-US"/>
+          </a:p>
+        </p:txBody>
+      </p:sp>
+    </p:spTree>
+    <p:extLst>
+      <p:ext uri="{BB962C8B-B14F-4D97-AF65-F5344CB8AC3E}">
+        <p14:creationId xmlns:p14="http://schemas.microsoft.com/office/powerpoint/2010/main" val="3061244098"/>
+      </p:ext>
+    </p:extLst>
+  </p:cSld>
+  <p:clrMapOvr>
+    <a:masterClrMapping/>
+  </p:clrMapOvr>
+</p:notes>
+</file>
+
+<file path=ppt/notesSlides/notesSlide29.xml><?xml version="1.0" encoding="utf-8"?>
+<p:notes xmlns:a="http://schemas.openxmlformats.org/drawingml/2006/main" xmlns:r="http://schemas.openxmlformats.org/officeDocument/2006/relationships" xmlns:p="http://schemas.openxmlformats.org/presentationml/2006/main">
+  <p:cSld>
+    <p:spTree>
+      <p:nvGrpSpPr>
+        <p:cNvPr id="1" name=""/>
+        <p:cNvGrpSpPr/>
+        <p:nvPr/>
+      </p:nvGrpSpPr>
+      <p:grpSpPr>
+        <a:xfrm>
+          <a:off x="0" y="0"/>
+          <a:ext cx="0" cy="0"/>
+          <a:chOff x="0" y="0"/>
+          <a:chExt cx="0" cy="0"/>
+        </a:xfrm>
+      </p:grpSpPr>
+      <p:sp>
+        <p:nvSpPr>
+          <p:cNvPr id="2" name="Slide Image Placeholder 1"/>
+          <p:cNvSpPr>
+            <a:spLocks noGrp="1" noRot="1" noChangeAspect="1"/>
+          </p:cNvSpPr>
+          <p:nvPr>
+            <p:ph type="sldImg"/>
+          </p:nvPr>
+        </p:nvSpPr>
+        <p:spPr/>
+      </p:sp>
+      <p:sp>
+        <p:nvSpPr>
+          <p:cNvPr id="3" name="Notes Placeholder 2"/>
+          <p:cNvSpPr>
+            <a:spLocks noGrp="1"/>
+          </p:cNvSpPr>
+          <p:nvPr>
+            <p:ph type="body" idx="1"/>
+          </p:nvPr>
+        </p:nvSpPr>
+        <p:spPr/>
+        <p:txBody>
+          <a:bodyPr/>
+          <a:lstStyle/>
+          <a:p>
+            <a:endParaRPr lang="en-US" dirty="0"/>
+          </a:p>
+        </p:txBody>
+      </p:sp>
+      <p:sp>
+        <p:nvSpPr>
+          <p:cNvPr id="4" name="Slide Number Placeholder 3"/>
+          <p:cNvSpPr>
+            <a:spLocks noGrp="1"/>
+          </p:cNvSpPr>
+          <p:nvPr>
+            <p:ph type="sldNum" sz="quarter" idx="10"/>
+          </p:nvPr>
+        </p:nvSpPr>
+        <p:spPr/>
+        <p:txBody>
+          <a:bodyPr/>
+          <a:lstStyle/>
+          <a:p>
+            <a:fld id="{3505E63B-9069-4A7B-94A1-6BD92A894BE1}" type="slidenum">
+              <a:rPr lang="en-US" smtClean="0"/>
+              <a:t>30</a:t>
+            </a:fld>
+            <a:endParaRPr lang="en-US"/>
+          </a:p>
+        </p:txBody>
+      </p:sp>
+    </p:spTree>
+    <p:extLst>
+      <p:ext uri="{BB962C8B-B14F-4D97-AF65-F5344CB8AC3E}">
+        <p14:creationId xmlns:p14="http://schemas.microsoft.com/office/powerpoint/2010/main" val="4130027731"/>
       </p:ext>
     </p:extLst>
   </p:cSld>
@@ -2359,6 +2619,90 @@
     <p:extLst>
       <p:ext uri="{BB962C8B-B14F-4D97-AF65-F5344CB8AC3E}">
         <p14:creationId xmlns:p14="http://schemas.microsoft.com/office/powerpoint/2010/main" val="573251286"/>
+      </p:ext>
+    </p:extLst>
+  </p:cSld>
+  <p:clrMapOvr>
+    <a:masterClrMapping/>
+  </p:clrMapOvr>
+</p:notes>
+</file>
+
+<file path=ppt/notesSlides/notesSlide30.xml><?xml version="1.0" encoding="utf-8"?>
+<p:notes xmlns:a="http://schemas.openxmlformats.org/drawingml/2006/main" xmlns:r="http://schemas.openxmlformats.org/officeDocument/2006/relationships" xmlns:p="http://schemas.openxmlformats.org/presentationml/2006/main">
+  <p:cSld>
+    <p:spTree>
+      <p:nvGrpSpPr>
+        <p:cNvPr id="1" name=""/>
+        <p:cNvGrpSpPr/>
+        <p:nvPr/>
+      </p:nvGrpSpPr>
+      <p:grpSpPr>
+        <a:xfrm>
+          <a:off x="0" y="0"/>
+          <a:ext cx="0" cy="0"/>
+          <a:chOff x="0" y="0"/>
+          <a:chExt cx="0" cy="0"/>
+        </a:xfrm>
+      </p:grpSpPr>
+      <p:sp>
+        <p:nvSpPr>
+          <p:cNvPr id="2" name="Slide Image Placeholder 1"/>
+          <p:cNvSpPr>
+            <a:spLocks noGrp="1" noRot="1" noChangeAspect="1"/>
+          </p:cNvSpPr>
+          <p:nvPr>
+            <p:ph type="sldImg"/>
+          </p:nvPr>
+        </p:nvSpPr>
+        <p:spPr/>
+      </p:sp>
+      <p:sp>
+        <p:nvSpPr>
+          <p:cNvPr id="3" name="Notes Placeholder 2"/>
+          <p:cNvSpPr>
+            <a:spLocks noGrp="1"/>
+          </p:cNvSpPr>
+          <p:nvPr>
+            <p:ph type="body" idx="1"/>
+          </p:nvPr>
+        </p:nvSpPr>
+        <p:spPr/>
+        <p:txBody>
+          <a:bodyPr/>
+          <a:lstStyle/>
+          <a:p>
+            <a:endParaRPr lang="en-US"/>
+          </a:p>
+        </p:txBody>
+      </p:sp>
+      <p:sp>
+        <p:nvSpPr>
+          <p:cNvPr id="4" name="Slide Number Placeholder 3"/>
+          <p:cNvSpPr>
+            <a:spLocks noGrp="1"/>
+          </p:cNvSpPr>
+          <p:nvPr>
+            <p:ph type="sldNum" sz="quarter" idx="10"/>
+          </p:nvPr>
+        </p:nvSpPr>
+        <p:spPr/>
+        <p:txBody>
+          <a:bodyPr/>
+          <a:lstStyle/>
+          <a:p>
+            <a:fld id="{3505E63B-9069-4A7B-94A1-6BD92A894BE1}" type="slidenum">
+              <a:rPr lang="en-US" smtClean="0"/>
+              <a:t>31</a:t>
+            </a:fld>
+            <a:endParaRPr lang="en-US"/>
+          </a:p>
+        </p:txBody>
+      </p:sp>
+    </p:spTree>
+    <p:extLst>
+      <p:ext uri="{BB962C8B-B14F-4D97-AF65-F5344CB8AC3E}">
+        <p14:creationId xmlns:p14="http://schemas.microsoft.com/office/powerpoint/2010/main" val="4097674902"/>
       </p:ext>
     </p:extLst>
   </p:cSld>
@@ -17583,7 +17927,7 @@
                 </a:solidFill>
               </a:rPr>
               <a:pPr defTabSz="914367"/>
-              <a:t>07-06-2015</a:t>
+              <a:t>08-06-2015</a:t>
             </a:fld>
             <a:endParaRPr lang="en-IN" dirty="0">
               <a:solidFill>
@@ -25261,6 +25605,13 @@
       </p:transition>
     </mc:Fallback>
   </mc:AlternateContent>
+  <p:timing>
+    <p:tnLst>
+      <p:par>
+        <p:cTn id="1" dur="indefinite" restart="never" nodeType="tmRoot"/>
+      </p:par>
+    </p:tnLst>
+  </p:timing>
 </p:sld>
 </file>
 
@@ -25492,6 +25843,13 @@
   <p:transition>
     <p:fade/>
   </p:transition>
+  <p:timing>
+    <p:tnLst>
+      <p:par>
+        <p:cTn id="1" dur="indefinite" restart="never" nodeType="tmRoot"/>
+      </p:par>
+    </p:tnLst>
+  </p:timing>
 </p:sld>
 </file>
 
@@ -25636,7 +25994,7 @@
         <p:spPr>
           <a:xfrm>
             <a:off x="4913195" y="1189176"/>
-            <a:ext cx="7009568" cy="5219891"/>
+            <a:ext cx="7009568" cy="3219343"/>
           </a:xfrm>
           <a:prstGeom prst="rect">
             <a:avLst/>
@@ -25665,7 +26023,7 @@
                   <a:schemeClr val="bg1"/>
                 </a:solidFill>
               </a:rPr>
-              <a:t>Complete control</a:t>
+              <a:t>Android Studio: Java</a:t>
             </a:r>
           </a:p>
           <a:p>
@@ -25680,12 +26038,20 @@
               <a:buChar char="•"/>
             </a:pPr>
             <a:r>
+              <a:rPr lang="en-US" sz="4000" dirty="0" err="1" smtClean="0">
+                <a:solidFill>
+                  <a:schemeClr val="bg1"/>
+                </a:solidFill>
+              </a:rPr>
+              <a:t>XCode</a:t>
+            </a:r>
+            <a:r>
               <a:rPr lang="en-US" sz="4000" dirty="0" smtClean="0">
                 <a:solidFill>
                   <a:schemeClr val="bg1"/>
                 </a:solidFill>
               </a:rPr>
-              <a:t>Highest learning curve</a:t>
+              <a:t>: Objective-C/Swift</a:t>
             </a:r>
           </a:p>
           <a:p>
@@ -25705,48 +26071,13 @@
                   <a:schemeClr val="bg1"/>
                 </a:solidFill>
               </a:rPr>
-              <a:t>Hardware control</a:t>
-            </a:r>
-          </a:p>
-          <a:p>
-            <a:pPr marL="342900" indent="-342900">
-              <a:lnSpc>
-                <a:spcPct val="150000"/>
-              </a:lnSpc>
-              <a:spcAft>
-                <a:spcPts val="600"/>
-              </a:spcAft>
-              <a:buFont typeface="Arial" panose="020B0604020202020204" pitchFamily="34" charset="0"/>
-              <a:buChar char="•"/>
-            </a:pPr>
-            <a:r>
-              <a:rPr lang="en-US" sz="4000" dirty="0" smtClean="0">
-                <a:solidFill>
-                  <a:schemeClr val="bg1"/>
-                </a:solidFill>
-              </a:rPr>
-              <a:t>No sharing of code</a:t>
-            </a:r>
-          </a:p>
-          <a:p>
-            <a:pPr marL="342900" indent="-342900">
-              <a:lnSpc>
-                <a:spcPct val="150000"/>
-              </a:lnSpc>
-              <a:spcAft>
-                <a:spcPts val="600"/>
-              </a:spcAft>
-              <a:buFont typeface="Arial" panose="020B0604020202020204" pitchFamily="34" charset="0"/>
-              <a:buChar char="•"/>
-            </a:pPr>
-            <a:r>
-              <a:rPr lang="en-US" sz="4000" dirty="0" smtClean="0">
-                <a:solidFill>
-                  <a:schemeClr val="bg1"/>
-                </a:solidFill>
-              </a:rPr>
-              <a:t>Offline execution</a:t>
-            </a:r>
+              <a:t>Visual Studio: C#/XAML</a:t>
+            </a:r>
+            <a:endParaRPr lang="en-US" sz="4000" dirty="0" smtClean="0">
+              <a:solidFill>
+                <a:schemeClr val="bg1"/>
+              </a:solidFill>
+            </a:endParaRPr>
           </a:p>
         </p:txBody>
       </p:sp>
@@ -25763,6 +26094,13 @@
   <p:transition>
     <p:fade/>
   </p:transition>
+  <p:timing>
+    <p:tnLst>
+      <p:par>
+        <p:cTn id="1" dur="indefinite" restart="never" nodeType="tmRoot"/>
+      </p:par>
+    </p:tnLst>
+  </p:timing>
 </p:sld>
 </file>
 
@@ -25806,6 +26144,15 @@
           <a:lstStyle/>
           <a:p>
             <a:r>
+              <a:rPr lang="en-US" b="1" dirty="0"/>
+              <a:t>Native</a:t>
+            </a:r>
+          </a:p>
+          <a:p>
+            <a:endParaRPr lang="en-US" dirty="0"/>
+          </a:p>
+          <a:p>
+            <a:r>
               <a:rPr lang="en-US" dirty="0">
                 <a:solidFill>
                   <a:schemeClr val="bg1">
@@ -25813,15 +26160,6 @@
                   </a:schemeClr>
                 </a:solidFill>
               </a:rPr>
-              <a:t>Native</a:t>
-            </a:r>
-          </a:p>
-          <a:p>
-            <a:endParaRPr lang="en-US" dirty="0"/>
-          </a:p>
-          <a:p>
-            <a:r>
-              <a:rPr lang="en-US" b="1" dirty="0"/>
               <a:t>Mobile Web</a:t>
             </a:r>
           </a:p>
@@ -25906,8 +26244,8 @@
         </p:nvSpPr>
         <p:spPr>
           <a:xfrm>
-            <a:off x="4954137" y="1189176"/>
-            <a:ext cx="6968625" cy="5219891"/>
+            <a:off x="4913195" y="1189176"/>
+            <a:ext cx="7009568" cy="5219891"/>
           </a:xfrm>
           <a:prstGeom prst="rect">
             <a:avLst/>
@@ -25936,15 +26274,7 @@
                   <a:schemeClr val="bg1"/>
                 </a:solidFill>
               </a:rPr>
-              <a:t>Lowest </a:t>
-            </a:r>
-            <a:r>
-              <a:rPr lang="en-US" sz="4000" dirty="0">
-                <a:solidFill>
-                  <a:schemeClr val="bg1"/>
-                </a:solidFill>
-              </a:rPr>
-              <a:t>learning curve</a:t>
+              <a:t>Complete control</a:t>
             </a:r>
           </a:p>
           <a:p>
@@ -25964,7 +26294,7 @@
                   <a:schemeClr val="bg1"/>
                 </a:solidFill>
               </a:rPr>
-              <a:t>Minimal device control</a:t>
+              <a:t>Highest learning curve</a:t>
             </a:r>
           </a:p>
           <a:p>
@@ -25984,7 +26314,7 @@
                   <a:schemeClr val="bg1"/>
                 </a:solidFill>
               </a:rPr>
-              <a:t>All code on server</a:t>
+              <a:t>Hardware control</a:t>
             </a:r>
           </a:p>
           <a:p>
@@ -26004,7 +26334,7 @@
                   <a:schemeClr val="bg1"/>
                 </a:solidFill>
               </a:rPr>
-              <a:t>No deployment</a:t>
+              <a:t>No sharing of code</a:t>
             </a:r>
           </a:p>
           <a:p>
@@ -26024,7 +26354,7 @@
                   <a:schemeClr val="bg1"/>
                 </a:solidFill>
               </a:rPr>
-              <a:t>No offline execution</a:t>
+              <a:t>Offline execution</a:t>
             </a:r>
           </a:p>
         </p:txBody>
@@ -26032,7 +26362,7 @@
     </p:spTree>
     <p:extLst>
       <p:ext uri="{BB962C8B-B14F-4D97-AF65-F5344CB8AC3E}">
-        <p14:creationId xmlns:p14="http://schemas.microsoft.com/office/powerpoint/2010/main" val="1320141369"/>
+        <p14:creationId xmlns:p14="http://schemas.microsoft.com/office/powerpoint/2010/main" val="3933273142"/>
       </p:ext>
     </p:extLst>
   </p:cSld>
@@ -26042,6 +26372,13 @@
   <p:transition>
     <p:fade/>
   </p:transition>
+  <p:timing>
+    <p:tnLst>
+      <p:par>
+        <p:cTn id="1" dur="indefinite" restart="never" nodeType="tmRoot"/>
+      </p:par>
+    </p:tnLst>
+  </p:timing>
 </p:sld>
 </file>
 
@@ -26100,13 +26437,7 @@
           </a:p>
           <a:p>
             <a:r>
-              <a:rPr lang="en-US" dirty="0">
-                <a:solidFill>
-                  <a:schemeClr val="bg1">
-                    <a:lumMod val="75000"/>
-                  </a:schemeClr>
-                </a:solidFill>
-              </a:rPr>
+              <a:rPr lang="en-US" b="1" dirty="0"/>
               <a:t>Mobile Web</a:t>
             </a:r>
           </a:p>
@@ -26122,7 +26453,13 @@
           </a:p>
           <a:p>
             <a:r>
-              <a:rPr lang="en-US" b="1" dirty="0"/>
+              <a:rPr lang="en-US" dirty="0">
+                <a:solidFill>
+                  <a:schemeClr val="bg1">
+                    <a:lumMod val="75000"/>
+                  </a:schemeClr>
+                </a:solidFill>
+              </a:rPr>
               <a:t>Apache Cordova</a:t>
             </a:r>
           </a:p>
@@ -26186,7 +26523,7 @@
         <p:spPr>
           <a:xfrm>
             <a:off x="4954137" y="1189176"/>
-            <a:ext cx="6968625" cy="4219617"/>
+            <a:ext cx="6968625" cy="3142399"/>
           </a:xfrm>
           <a:prstGeom prst="rect">
             <a:avLst/>
@@ -26215,15 +26552,7 @@
                   <a:schemeClr val="bg1"/>
                 </a:solidFill>
               </a:rPr>
-              <a:t>Low </a:t>
-            </a:r>
-            <a:r>
-              <a:rPr lang="en-US" sz="4000" dirty="0">
-                <a:solidFill>
-                  <a:schemeClr val="bg1"/>
-                </a:solidFill>
-              </a:rPr>
-              <a:t>learning curve</a:t>
+              <a:t>Visual Studio: ASP.NET</a:t>
             </a:r>
           </a:p>
           <a:p>
@@ -26243,55 +26572,28 @@
                   <a:schemeClr val="bg1"/>
                 </a:solidFill>
               </a:rPr>
-              <a:t>Moderate device control</a:t>
-            </a:r>
-          </a:p>
-          <a:p>
-            <a:pPr marL="342900" indent="-342900">
-              <a:lnSpc>
-                <a:spcPct val="150000"/>
-              </a:lnSpc>
-              <a:spcAft>
-                <a:spcPts val="600"/>
-              </a:spcAft>
-              <a:buFont typeface="Arial" panose="020B0604020202020204" pitchFamily="34" charset="0"/>
-              <a:buChar char="•"/>
-            </a:pPr>
-            <a:r>
-              <a:rPr lang="en-US" sz="4000" dirty="0" smtClean="0">
+              <a:t>C#, VB.NET, HTML, </a:t>
+            </a:r>
+            <a:r>
+              <a:rPr lang="en-US" sz="4000" dirty="0" err="1" smtClean="0">
                 <a:solidFill>
                   <a:schemeClr val="bg1"/>
                 </a:solidFill>
               </a:rPr>
-              <a:t>Highly shared code</a:t>
-            </a:r>
-          </a:p>
-          <a:p>
-            <a:pPr marL="342900" indent="-342900">
-              <a:lnSpc>
-                <a:spcPct val="150000"/>
-              </a:lnSpc>
-              <a:spcAft>
-                <a:spcPts val="600"/>
-              </a:spcAft>
-              <a:buFont typeface="Arial" panose="020B0604020202020204" pitchFamily="34" charset="0"/>
-              <a:buChar char="•"/>
-            </a:pPr>
-            <a:r>
-              <a:rPr lang="en-US" sz="4000" dirty="0" smtClean="0">
-                <a:solidFill>
-                  <a:schemeClr val="bg1"/>
-                </a:solidFill>
-              </a:rPr>
-              <a:t>Offline execution</a:t>
-            </a:r>
+              <a:t>Javascript</a:t>
+            </a:r>
+            <a:endParaRPr lang="en-US" sz="4000" dirty="0" smtClean="0">
+              <a:solidFill>
+                <a:schemeClr val="bg1"/>
+              </a:solidFill>
+            </a:endParaRPr>
           </a:p>
         </p:txBody>
       </p:sp>
     </p:spTree>
     <p:extLst>
       <p:ext uri="{BB962C8B-B14F-4D97-AF65-F5344CB8AC3E}">
-        <p14:creationId xmlns:p14="http://schemas.microsoft.com/office/powerpoint/2010/main" val="3059520678"/>
+        <p14:creationId xmlns:p14="http://schemas.microsoft.com/office/powerpoint/2010/main" val="1320141369"/>
       </p:ext>
     </p:extLst>
   </p:cSld>
@@ -26301,6 +26603,13 @@
   <p:transition>
     <p:fade/>
   </p:transition>
+  <p:timing>
+    <p:tnLst>
+      <p:par>
+        <p:cTn id="1" dur="indefinite" restart="never" nodeType="tmRoot"/>
+      </p:par>
+    </p:tnLst>
+  </p:timing>
 </p:sld>
 </file>
 
@@ -26359,13 +26668,7 @@
           </a:p>
           <a:p>
             <a:r>
-              <a:rPr lang="en-US" dirty="0">
-                <a:solidFill>
-                  <a:schemeClr val="bg1">
-                    <a:lumMod val="75000"/>
-                  </a:schemeClr>
-                </a:solidFill>
-              </a:rPr>
+              <a:rPr lang="en-US" b="1" dirty="0"/>
               <a:t>Mobile Web</a:t>
             </a:r>
           </a:p>
@@ -26403,7 +26706,13 @@
           </a:p>
           <a:p>
             <a:r>
-              <a:rPr lang="en-US" b="1" dirty="0"/>
+              <a:rPr lang="en-US" dirty="0">
+                <a:solidFill>
+                  <a:schemeClr val="bg1">
+                    <a:lumMod val="75000"/>
+                  </a:schemeClr>
+                </a:solidFill>
+              </a:rPr>
               <a:t>Telerik Platform</a:t>
             </a:r>
           </a:p>
@@ -26474,7 +26783,7 @@
                   <a:schemeClr val="bg1"/>
                 </a:solidFill>
               </a:rPr>
-              <a:t>Low </a:t>
+              <a:t>Lowest </a:t>
             </a:r>
             <a:r>
               <a:rPr lang="en-US" sz="4000" dirty="0">
@@ -26482,15 +26791,7 @@
                   <a:schemeClr val="bg1"/>
                 </a:solidFill>
               </a:rPr>
-              <a:t>learning </a:t>
-            </a:r>
-            <a:r>
-              <a:rPr lang="en-US" sz="4000" dirty="0" smtClean="0">
-                <a:solidFill>
-                  <a:schemeClr val="bg1"/>
-                </a:solidFill>
-              </a:rPr>
-              <a:t>curve</a:t>
+              <a:t>learning curve</a:t>
             </a:r>
           </a:p>
           <a:p>
@@ -26510,13 +26811,8 @@
                   <a:schemeClr val="bg1"/>
                 </a:solidFill>
               </a:rPr>
-              <a:t>Less mature</a:t>
-            </a:r>
-            <a:endParaRPr lang="en-US" sz="4000" dirty="0">
-              <a:solidFill>
-                <a:schemeClr val="bg1"/>
-              </a:solidFill>
-            </a:endParaRPr>
+              <a:t>Minimal device control</a:t>
+            </a:r>
           </a:p>
           <a:p>
             <a:pPr marL="342900" indent="-342900">
@@ -26535,7 +26831,7 @@
                   <a:schemeClr val="bg1"/>
                 </a:solidFill>
               </a:rPr>
-              <a:t>Moderate device control</a:t>
+              <a:t>All code on server</a:t>
             </a:r>
           </a:p>
           <a:p>
@@ -26555,7 +26851,7 @@
                   <a:schemeClr val="bg1"/>
                 </a:solidFill>
               </a:rPr>
-              <a:t>Highly shared code</a:t>
+              <a:t>No deployment</a:t>
             </a:r>
           </a:p>
           <a:p>
@@ -26575,7 +26871,7 @@
                   <a:schemeClr val="bg1"/>
                 </a:solidFill>
               </a:rPr>
-              <a:t>Offline execution</a:t>
+              <a:t>No offline execution</a:t>
             </a:r>
           </a:p>
         </p:txBody>
@@ -26583,7 +26879,7 @@
     </p:spTree>
     <p:extLst>
       <p:ext uri="{BB962C8B-B14F-4D97-AF65-F5344CB8AC3E}">
-        <p14:creationId xmlns:p14="http://schemas.microsoft.com/office/powerpoint/2010/main" val="626003694"/>
+        <p14:creationId xmlns:p14="http://schemas.microsoft.com/office/powerpoint/2010/main" val="2048190764"/>
       </p:ext>
     </p:extLst>
   </p:cSld>
@@ -26593,20 +26889,19 @@
   <p:transition>
     <p:fade/>
   </p:transition>
+  <p:timing>
+    <p:tnLst>
+      <p:par>
+        <p:cTn id="1" dur="indefinite" restart="never" nodeType="tmRoot"/>
+      </p:par>
+    </p:tnLst>
+  </p:timing>
 </p:sld>
 </file>
 
 <file path=ppt/slides/slide17.xml><?xml version="1.0" encoding="utf-8"?>
 <p:sld xmlns:a="http://schemas.openxmlformats.org/drawingml/2006/main" xmlns:r="http://schemas.openxmlformats.org/officeDocument/2006/relationships" xmlns:p="http://schemas.openxmlformats.org/presentationml/2006/main">
   <p:cSld>
-    <p:bg>
-      <p:bgPr>
-        <a:solidFill>
-          <a:schemeClr val="accent1"/>
-        </a:solidFill>
-        <a:effectLst/>
-      </p:bgPr>
-    </p:bg>
     <p:spTree>
       <p:nvGrpSpPr>
         <p:cNvPr id="1" name=""/>
@@ -26623,88 +26918,129 @@
       </p:grpSpPr>
       <p:sp>
         <p:nvSpPr>
-          <p:cNvPr id="4" name="Title 3"/>
+          <p:cNvPr id="4" name="Text Placeholder 3"/>
           <p:cNvSpPr>
             <a:spLocks noGrp="1"/>
           </p:cNvSpPr>
           <p:nvPr>
-            <p:ph type="title"/>
+            <p:ph type="body" sz="quarter" idx="10"/>
           </p:nvPr>
         </p:nvSpPr>
         <p:spPr>
           <a:xfrm>
-            <a:off x="5805675" y="1217195"/>
-            <a:ext cx="6117087" cy="922690"/>
+            <a:off x="269239" y="1189177"/>
+            <a:ext cx="11653523" cy="4709944"/>
           </a:xfrm>
         </p:spPr>
         <p:txBody>
+          <a:bodyPr vert="horz" wrap="square" lIns="146304" tIns="91440" rIns="146304" bIns="91440" rtlCol="0" anchor="t">
+            <a:spAutoFit/>
+          </a:bodyPr>
+          <a:lstStyle/>
+          <a:p>
+            <a:r>
+              <a:rPr lang="en-US" dirty="0">
+                <a:solidFill>
+                  <a:schemeClr val="bg1">
+                    <a:lumMod val="75000"/>
+                  </a:schemeClr>
+                </a:solidFill>
+              </a:rPr>
+              <a:t>Native</a:t>
+            </a:r>
+          </a:p>
+          <a:p>
+            <a:endParaRPr lang="en-US" dirty="0"/>
+          </a:p>
+          <a:p>
+            <a:r>
+              <a:rPr lang="en-US" dirty="0">
+                <a:solidFill>
+                  <a:schemeClr val="bg1">
+                    <a:lumMod val="75000"/>
+                  </a:schemeClr>
+                </a:solidFill>
+              </a:rPr>
+              <a:t>Mobile Web</a:t>
+            </a:r>
+          </a:p>
+          <a:p>
+            <a:endParaRPr lang="en-US" dirty="0">
+              <a:solidFill>
+                <a:schemeClr val="bg1">
+                  <a:lumMod val="75000"/>
+                </a:schemeClr>
+              </a:solidFill>
+              <a:cs typeface="Segoe UI Light"/>
+            </a:endParaRPr>
+          </a:p>
+          <a:p>
+            <a:r>
+              <a:rPr lang="en-US" b="1" dirty="0"/>
+              <a:t>Apache Cordova</a:t>
+            </a:r>
+          </a:p>
+          <a:p>
+            <a:endParaRPr lang="en-US" dirty="0">
+              <a:solidFill>
+                <a:schemeClr val="bg1">
+                  <a:lumMod val="75000"/>
+                </a:schemeClr>
+              </a:solidFill>
+              <a:cs typeface="Segoe UI Light"/>
+            </a:endParaRPr>
+          </a:p>
+          <a:p>
+            <a:r>
+              <a:rPr lang="en-US" dirty="0">
+                <a:solidFill>
+                  <a:schemeClr val="bg1">
+                    <a:lumMod val="75000"/>
+                  </a:schemeClr>
+                </a:solidFill>
+              </a:rPr>
+              <a:t>Telerik Platform</a:t>
+            </a:r>
+          </a:p>
+        </p:txBody>
+      </p:sp>
+      <p:sp>
+        <p:nvSpPr>
+          <p:cNvPr id="3" name="Title 2"/>
+          <p:cNvSpPr>
+            <a:spLocks noGrp="1"/>
+          </p:cNvSpPr>
+          <p:nvPr>
+            <p:ph type="title"/>
+          </p:nvPr>
+        </p:nvSpPr>
+        <p:spPr/>
+        <p:txBody>
           <a:bodyPr/>
           <a:lstStyle/>
           <a:p>
             <a:r>
-              <a:rPr lang="en-US" sz="5400" dirty="0" err="1" smtClean="0">
-                <a:solidFill>
-                  <a:srgbClr val="FFFFFF"/>
-                </a:solidFill>
-              </a:rPr>
-              <a:t>ThoughtWorks</a:t>
-            </a:r>
-            <a:r>
-              <a:rPr lang="en-US" sz="5400" dirty="0" smtClean="0">
-                <a:solidFill>
-                  <a:srgbClr val="FFFFFF"/>
-                </a:solidFill>
-              </a:rPr>
-              <a:t> Radar</a:t>
-            </a:r>
-            <a:endParaRPr lang="en-US" sz="5400" dirty="0">
-              <a:solidFill>
-                <a:srgbClr val="FFFFFF"/>
-              </a:solidFill>
-            </a:endParaRPr>
-          </a:p>
-        </p:txBody>
-      </p:sp>
-      <p:pic>
-        <p:nvPicPr>
-          <p:cNvPr id="6" name="Picture Placeholder 5"/>
-          <p:cNvPicPr>
-            <a:picLocks noGrp="1" noChangeAspect="1"/>
-          </p:cNvPicPr>
-          <p:nvPr>
-            <p:ph type="pic" sz="quarter" idx="10"/>
-          </p:nvPr>
-        </p:nvPicPr>
-        <p:blipFill>
-          <a:blip r:embed="rId3">
-            <a:extLst>
-              <a:ext uri="{28A0092B-C50C-407E-A947-70E740481C1C}">
-                <a14:useLocalDpi xmlns:a14="http://schemas.microsoft.com/office/drawing/2010/main" val="0"/>
-              </a:ext>
-            </a:extLst>
-          </a:blip>
-          <a:srcRect l="7759" r="7759"/>
-          <a:stretch>
-            <a:fillRect/>
-          </a:stretch>
-        </p:blipFill>
+              <a:rPr lang="en-US" dirty="0" err="1" smtClean="0"/>
+              <a:t>Xamarin</a:t>
+            </a:r>
+            <a:r>
+              <a:rPr lang="en-US" dirty="0" smtClean="0"/>
+              <a:t> vs. Alternatives</a:t>
+            </a:r>
+            <a:endParaRPr lang="en-US" dirty="0"/>
+          </a:p>
+        </p:txBody>
+      </p:sp>
+      <p:sp>
+        <p:nvSpPr>
+          <p:cNvPr id="2" name="TextBox 1"/>
+          <p:cNvSpPr txBox="1"/>
+          <p:nvPr/>
+        </p:nvSpPr>
         <p:spPr>
           <a:xfrm>
-            <a:off x="329939" y="801279"/>
-            <a:ext cx="5475736" cy="5552388"/>
-          </a:xfrm>
-        </p:spPr>
-      </p:pic>
-      <p:sp>
-        <p:nvSpPr>
-          <p:cNvPr id="7" name="TextBox 6"/>
-          <p:cNvSpPr txBox="1"/>
-          <p:nvPr/>
-        </p:nvSpPr>
-        <p:spPr>
-          <a:xfrm>
-            <a:off x="6540118" y="2362333"/>
-            <a:ext cx="4648199" cy="923330"/>
+            <a:off x="4954137" y="1189176"/>
+            <a:ext cx="6968625" cy="3219343"/>
           </a:xfrm>
           <a:prstGeom prst="rect">
             <a:avLst/>
@@ -26712,97 +27048,80 @@
           <a:noFill/>
         </p:spPr>
         <p:txBody>
-          <a:bodyPr wrap="square" rtlCol="0">
+          <a:bodyPr wrap="square" lIns="182880" tIns="146304" rIns="182880" bIns="146304" rtlCol="0">
             <a:spAutoFit/>
           </a:bodyPr>
           <a:lstStyle/>
           <a:p>
-            <a:r>
-              <a:rPr lang="en-US" dirty="0">
+            <a:pPr marL="342900" indent="-342900">
+              <a:lnSpc>
+                <a:spcPct val="150000"/>
+              </a:lnSpc>
+              <a:spcAft>
+                <a:spcPts val="600"/>
+              </a:spcAft>
+              <a:buFont typeface="Arial" panose="020B0604020202020204" pitchFamily="34" charset="0"/>
+              <a:buChar char="•"/>
+            </a:pPr>
+            <a:r>
+              <a:rPr lang="en-US" sz="4000" dirty="0" smtClean="0">
                 <a:solidFill>
-                  <a:srgbClr val="FFFFFF"/>
+                  <a:schemeClr val="bg1"/>
                 </a:solidFill>
               </a:rPr>
-              <a:t>We are excited by the progress made by </a:t>
-            </a:r>
-            <a:r>
-              <a:rPr lang="en-US" b="1" dirty="0" err="1">
+              <a:t>Text Editor</a:t>
+            </a:r>
+          </a:p>
+          <a:p>
+            <a:pPr marL="342900" indent="-342900">
+              <a:lnSpc>
+                <a:spcPct val="150000"/>
+              </a:lnSpc>
+              <a:spcAft>
+                <a:spcPts val="600"/>
+              </a:spcAft>
+              <a:buFont typeface="Arial" panose="020B0604020202020204" pitchFamily="34" charset="0"/>
+              <a:buChar char="•"/>
+            </a:pPr>
+            <a:r>
+              <a:rPr lang="en-US" sz="4000" dirty="0" smtClean="0">
                 <a:solidFill>
-                  <a:srgbClr val="FFFFFF"/>
+                  <a:schemeClr val="bg1"/>
                 </a:solidFill>
               </a:rPr>
-              <a:t>Xamarin</a:t>
-            </a:r>
-            <a:r>
-              <a:rPr lang="en-US" dirty="0">
+              <a:t>Visual Studio 2015</a:t>
+            </a:r>
+          </a:p>
+          <a:p>
+            <a:pPr marL="342900" indent="-342900">
+              <a:lnSpc>
+                <a:spcPct val="150000"/>
+              </a:lnSpc>
+              <a:spcAft>
+                <a:spcPts val="600"/>
+              </a:spcAft>
+              <a:buFont typeface="Arial" panose="020B0604020202020204" pitchFamily="34" charset="0"/>
+              <a:buChar char="•"/>
+            </a:pPr>
+            <a:r>
+              <a:rPr lang="en-US" sz="4000" dirty="0" smtClean="0">
                 <a:solidFill>
-                  <a:srgbClr val="FFFFFF"/>
+                  <a:schemeClr val="bg1"/>
                 </a:solidFill>
               </a:rPr>
-              <a:t> in offering a solid choice for building cross-platform mobile apps</a:t>
-            </a:r>
-            <a:r>
-              <a:rPr lang="en-US" dirty="0" smtClean="0">
+              <a:t>HTML, </a:t>
+            </a:r>
+            <a:r>
+              <a:rPr lang="en-US" sz="4000" dirty="0" err="1" smtClean="0">
                 <a:solidFill>
-                  <a:srgbClr val="FFFFFF"/>
+                  <a:schemeClr val="bg1"/>
                 </a:solidFill>
               </a:rPr>
-              <a:t>.</a:t>
-            </a:r>
-          </a:p>
-        </p:txBody>
-      </p:sp>
-      <p:sp>
-        <p:nvSpPr>
-          <p:cNvPr id="8" name="TextBox 7"/>
-          <p:cNvSpPr txBox="1"/>
-          <p:nvPr/>
-        </p:nvSpPr>
-        <p:spPr>
-          <a:xfrm>
-            <a:off x="6540118" y="3508112"/>
-            <a:ext cx="4495800" cy="1631216"/>
-          </a:xfrm>
-          <a:prstGeom prst="rect">
-            <a:avLst/>
-          </a:prstGeom>
-          <a:noFill/>
-        </p:spPr>
-        <p:txBody>
-          <a:bodyPr wrap="square" rtlCol="0">
-            <a:spAutoFit/>
-          </a:bodyPr>
-          <a:lstStyle/>
-          <a:p>
-            <a:r>
-              <a:rPr lang="en-US" sz="1000" dirty="0">
-                <a:solidFill>
-                  <a:srgbClr val="FFFFFF"/>
-                </a:solidFill>
-              </a:rPr>
-              <a:t>It supports C# and F# as the primary languages with bindings to platform specific SDKs and the Mono runtime environment that works across iOS, Android and Windows Phone. Applications are compiled to native code giving apps a more native look and feel. When using this toolset, it is imperative that the platform specific UI tier be separated from the rest of the tiers to ensure code reuse across different platforms. The recent open-sourcing of the .NET platform should be beneficial for </a:t>
-            </a:r>
-            <a:r>
-              <a:rPr lang="en-US" sz="1000" b="1" dirty="0" err="1">
-                <a:solidFill>
-                  <a:srgbClr val="FFFFFF"/>
-                </a:solidFill>
-              </a:rPr>
-              <a:t>Xamarin</a:t>
-            </a:r>
-            <a:r>
-              <a:rPr lang="en-US" sz="1000" dirty="0">
-                <a:solidFill>
-                  <a:srgbClr val="FFFFFF"/>
-                </a:solidFill>
-              </a:rPr>
-              <a:t> both in allowing access to a broader set of .NET tooling and also making development easier on other operating systems. </a:t>
-            </a:r>
-          </a:p>
-          <a:p>
-            <a:endParaRPr lang="en-US" sz="1000" dirty="0">
+              <a:t>Javascript</a:t>
+            </a:r>
+            <a:endParaRPr lang="en-US" sz="4000" dirty="0" smtClean="0">
               <a:solidFill>
-                <a:srgbClr val="FFFFFF"/>
+                <a:schemeClr val="bg1"/>
               </a:solidFill>
             </a:endParaRPr>
           </a:p>
@@ -26811,7 +27130,7 @@
     </p:spTree>
     <p:extLst>
       <p:ext uri="{BB962C8B-B14F-4D97-AF65-F5344CB8AC3E}">
-        <p14:creationId xmlns:p14="http://schemas.microsoft.com/office/powerpoint/2010/main" val="3752299454"/>
+        <p14:creationId xmlns:p14="http://schemas.microsoft.com/office/powerpoint/2010/main" val="3059520678"/>
       </p:ext>
     </p:extLst>
   </p:cSld>
@@ -26821,20 +27140,19 @@
   <p:transition>
     <p:fade/>
   </p:transition>
+  <p:timing>
+    <p:tnLst>
+      <p:par>
+        <p:cTn id="1" dur="indefinite" restart="never" nodeType="tmRoot"/>
+      </p:par>
+    </p:tnLst>
+  </p:timing>
 </p:sld>
 </file>
 
 <file path=ppt/slides/slide18.xml><?xml version="1.0" encoding="utf-8"?>
 <p:sld xmlns:a="http://schemas.openxmlformats.org/drawingml/2006/main" xmlns:r="http://schemas.openxmlformats.org/officeDocument/2006/relationships" xmlns:p="http://schemas.openxmlformats.org/presentationml/2006/main">
   <p:cSld>
-    <p:bg>
-      <p:bgPr>
-        <a:solidFill>
-          <a:schemeClr val="accent1"/>
-        </a:solidFill>
-        <a:effectLst/>
-      </p:bgPr>
-    </p:bg>
     <p:spTree>
       <p:nvGrpSpPr>
         <p:cNvPr id="1" name=""/>
@@ -26851,81 +27169,234 @@
       </p:grpSpPr>
       <p:sp>
         <p:nvSpPr>
-          <p:cNvPr id="2" name="Title 1"/>
+          <p:cNvPr id="4" name="Text Placeholder 3"/>
           <p:cNvSpPr>
             <a:spLocks noGrp="1"/>
           </p:cNvSpPr>
           <p:nvPr>
-            <p:ph type="title"/>
+            <p:ph type="body" sz="quarter" idx="10"/>
           </p:nvPr>
         </p:nvSpPr>
         <p:spPr>
           <a:xfrm>
-            <a:off x="286962" y="1270357"/>
-            <a:ext cx="5378548" cy="1763530"/>
+            <a:off x="269239" y="1189177"/>
+            <a:ext cx="11653523" cy="4709944"/>
           </a:xfrm>
         </p:spPr>
         <p:txBody>
+          <a:bodyPr vert="horz" wrap="square" lIns="146304" tIns="91440" rIns="146304" bIns="91440" rtlCol="0" anchor="t">
+            <a:spAutoFit/>
+          </a:bodyPr>
+          <a:lstStyle/>
+          <a:p>
+            <a:r>
+              <a:rPr lang="en-US" dirty="0">
+                <a:solidFill>
+                  <a:schemeClr val="bg1">
+                    <a:lumMod val="75000"/>
+                  </a:schemeClr>
+                </a:solidFill>
+              </a:rPr>
+              <a:t>Native</a:t>
+            </a:r>
+          </a:p>
+          <a:p>
+            <a:endParaRPr lang="en-US" dirty="0"/>
+          </a:p>
+          <a:p>
+            <a:r>
+              <a:rPr lang="en-US" dirty="0">
+                <a:solidFill>
+                  <a:schemeClr val="bg1">
+                    <a:lumMod val="75000"/>
+                  </a:schemeClr>
+                </a:solidFill>
+              </a:rPr>
+              <a:t>Mobile Web</a:t>
+            </a:r>
+          </a:p>
+          <a:p>
+            <a:endParaRPr lang="en-US" dirty="0">
+              <a:solidFill>
+                <a:schemeClr val="bg1">
+                  <a:lumMod val="75000"/>
+                </a:schemeClr>
+              </a:solidFill>
+              <a:cs typeface="Segoe UI Light"/>
+            </a:endParaRPr>
+          </a:p>
+          <a:p>
+            <a:r>
+              <a:rPr lang="en-US" b="1" dirty="0"/>
+              <a:t>Apache Cordova</a:t>
+            </a:r>
+          </a:p>
+          <a:p>
+            <a:endParaRPr lang="en-US" dirty="0">
+              <a:solidFill>
+                <a:schemeClr val="bg1">
+                  <a:lumMod val="75000"/>
+                </a:schemeClr>
+              </a:solidFill>
+              <a:cs typeface="Segoe UI Light"/>
+            </a:endParaRPr>
+          </a:p>
+          <a:p>
+            <a:r>
+              <a:rPr lang="en-US" dirty="0">
+                <a:solidFill>
+                  <a:schemeClr val="bg1">
+                    <a:lumMod val="75000"/>
+                  </a:schemeClr>
+                </a:solidFill>
+              </a:rPr>
+              <a:t>Telerik Platform</a:t>
+            </a:r>
+          </a:p>
+        </p:txBody>
+      </p:sp>
+      <p:sp>
+        <p:nvSpPr>
+          <p:cNvPr id="3" name="Title 2"/>
+          <p:cNvSpPr>
+            <a:spLocks noGrp="1"/>
+          </p:cNvSpPr>
+          <p:nvPr>
+            <p:ph type="title"/>
+          </p:nvPr>
+        </p:nvSpPr>
+        <p:spPr/>
+        <p:txBody>
           <a:bodyPr/>
           <a:lstStyle/>
           <a:p>
             <a:r>
-              <a:rPr lang="en-US" sz="5400" dirty="0">
-                <a:solidFill>
-                  <a:srgbClr val="FFFFFF"/>
-                </a:solidFill>
-                <a:cs typeface="Segoe UI Light"/>
-              </a:rPr>
-              <a:t>Gartner's</a:t>
-            </a:r>
-            <a:br>
-              <a:rPr lang="en-US" sz="5400" dirty="0">
-                <a:solidFill>
-                  <a:srgbClr val="FFFFFF"/>
-                </a:solidFill>
-                <a:cs typeface="Segoe UI Light"/>
-              </a:rPr>
-            </a:br>
-            <a:r>
-              <a:rPr lang="en-US" sz="5400">
-                <a:solidFill>
-                  <a:srgbClr val="FFFFFF"/>
-                </a:solidFill>
-                <a:cs typeface="Segoe UI Light"/>
-              </a:rPr>
-              <a:t>Magic Quadrant</a:t>
-            </a:r>
-          </a:p>
-        </p:txBody>
-      </p:sp>
-      <p:pic>
-        <p:nvPicPr>
-          <p:cNvPr id="5" name="Picture Placeholder 4" descr="Screenshot_2015-06-06-14-48-13-2.jpg"/>
-          <p:cNvPicPr>
-            <a:picLocks noGrp="1" noChangeAspect="1"/>
-          </p:cNvPicPr>
-          <p:nvPr>
-            <p:ph type="pic" sz="quarter" idx="10"/>
-          </p:nvPr>
-        </p:nvPicPr>
-        <p:blipFill>
-          <a:blip r:embed="rId3"/>
-          <a:srcRect l="4616" r="4616"/>
-          <a:stretch>
-            <a:fillRect/>
-          </a:stretch>
-        </p:blipFill>
+              <a:rPr lang="en-US" dirty="0" err="1" smtClean="0"/>
+              <a:t>Xamarin</a:t>
+            </a:r>
+            <a:r>
+              <a:rPr lang="en-US" dirty="0" smtClean="0"/>
+              <a:t> vs. Alternatives</a:t>
+            </a:r>
+            <a:endParaRPr lang="en-US" dirty="0"/>
+          </a:p>
+        </p:txBody>
+      </p:sp>
+      <p:sp>
+        <p:nvSpPr>
+          <p:cNvPr id="2" name="TextBox 1"/>
+          <p:cNvSpPr txBox="1"/>
+          <p:nvPr/>
+        </p:nvSpPr>
         <p:spPr>
           <a:xfrm>
-            <a:off x="6116653" y="283534"/>
-            <a:ext cx="5848409" cy="6324786"/>
+            <a:off x="4954137" y="1189176"/>
+            <a:ext cx="6968625" cy="4219617"/>
           </a:xfrm>
+          <a:prstGeom prst="rect">
+            <a:avLst/>
+          </a:prstGeom>
+          <a:noFill/>
         </p:spPr>
-      </p:pic>
+        <p:txBody>
+          <a:bodyPr wrap="square" lIns="182880" tIns="146304" rIns="182880" bIns="146304" rtlCol="0">
+            <a:spAutoFit/>
+          </a:bodyPr>
+          <a:lstStyle/>
+          <a:p>
+            <a:pPr marL="342900" indent="-342900">
+              <a:lnSpc>
+                <a:spcPct val="150000"/>
+              </a:lnSpc>
+              <a:spcAft>
+                <a:spcPts val="600"/>
+              </a:spcAft>
+              <a:buFont typeface="Arial" panose="020B0604020202020204" pitchFamily="34" charset="0"/>
+              <a:buChar char="•"/>
+            </a:pPr>
+            <a:r>
+              <a:rPr lang="en-US" sz="4000" dirty="0" smtClean="0">
+                <a:solidFill>
+                  <a:schemeClr val="bg1"/>
+                </a:solidFill>
+              </a:rPr>
+              <a:t>Low </a:t>
+            </a:r>
+            <a:r>
+              <a:rPr lang="en-US" sz="4000" dirty="0">
+                <a:solidFill>
+                  <a:schemeClr val="bg1"/>
+                </a:solidFill>
+              </a:rPr>
+              <a:t>learning curve</a:t>
+            </a:r>
+          </a:p>
+          <a:p>
+            <a:pPr marL="342900" indent="-342900">
+              <a:lnSpc>
+                <a:spcPct val="150000"/>
+              </a:lnSpc>
+              <a:spcAft>
+                <a:spcPts val="600"/>
+              </a:spcAft>
+              <a:buFont typeface="Arial" panose="020B0604020202020204" pitchFamily="34" charset="0"/>
+              <a:buChar char="•"/>
+            </a:pPr>
+            <a:r>
+              <a:rPr lang="en-US" sz="4000" dirty="0" smtClean="0">
+                <a:solidFill>
+                  <a:schemeClr val="bg1"/>
+                </a:solidFill>
+              </a:rPr>
+              <a:t>Moderate device control</a:t>
+            </a:r>
+          </a:p>
+          <a:p>
+            <a:pPr marL="342900" indent="-342900">
+              <a:lnSpc>
+                <a:spcPct val="150000"/>
+              </a:lnSpc>
+              <a:spcAft>
+                <a:spcPts val="600"/>
+              </a:spcAft>
+              <a:buFont typeface="Arial" panose="020B0604020202020204" pitchFamily="34" charset="0"/>
+              <a:buChar char="•"/>
+            </a:pPr>
+            <a:r>
+              <a:rPr lang="en-US" sz="4000" dirty="0" smtClean="0">
+                <a:solidFill>
+                  <a:schemeClr val="bg1"/>
+                </a:solidFill>
+              </a:rPr>
+              <a:t>Highly shared code</a:t>
+            </a:r>
+          </a:p>
+          <a:p>
+            <a:pPr marL="342900" indent="-342900">
+              <a:lnSpc>
+                <a:spcPct val="150000"/>
+              </a:lnSpc>
+              <a:spcAft>
+                <a:spcPts val="600"/>
+              </a:spcAft>
+              <a:buFont typeface="Arial" panose="020B0604020202020204" pitchFamily="34" charset="0"/>
+              <a:buChar char="•"/>
+            </a:pPr>
+            <a:r>
+              <a:rPr lang="en-US" sz="4000" dirty="0" smtClean="0">
+                <a:solidFill>
+                  <a:schemeClr val="bg1"/>
+                </a:solidFill>
+              </a:rPr>
+              <a:t>Offline execution</a:t>
+            </a:r>
+          </a:p>
+        </p:txBody>
+      </p:sp>
     </p:spTree>
     <p:extLst>
       <p:ext uri="{BB962C8B-B14F-4D97-AF65-F5344CB8AC3E}">
-        <p14:creationId xmlns:p14="http://schemas.microsoft.com/office/powerpoint/2010/main" val="1198292956"/>
+        <p14:creationId xmlns:p14="http://schemas.microsoft.com/office/powerpoint/2010/main" val="494128729"/>
       </p:ext>
     </p:extLst>
   </p:cSld>
@@ -26935,20 +27406,19 @@
   <p:transition>
     <p:fade/>
   </p:transition>
+  <p:timing>
+    <p:tnLst>
+      <p:par>
+        <p:cTn id="1" dur="indefinite" restart="never" nodeType="tmRoot"/>
+      </p:par>
+    </p:tnLst>
+  </p:timing>
 </p:sld>
 </file>
 
 <file path=ppt/slides/slide19.xml><?xml version="1.0" encoding="utf-8"?>
 <p:sld xmlns:a="http://schemas.openxmlformats.org/drawingml/2006/main" xmlns:r="http://schemas.openxmlformats.org/officeDocument/2006/relationships" xmlns:p="http://schemas.openxmlformats.org/presentationml/2006/main">
   <p:cSld>
-    <p:bg>
-      <p:bgPr>
-        <a:solidFill>
-          <a:schemeClr val="accent1"/>
-        </a:solidFill>
-        <a:effectLst/>
-      </p:bgPr>
-    </p:bg>
     <p:spTree>
       <p:nvGrpSpPr>
         <p:cNvPr id="1" name=""/>
@@ -26965,151 +27435,191 @@
       </p:grpSpPr>
       <p:sp>
         <p:nvSpPr>
-          <p:cNvPr id="2" name="Title 1"/>
+          <p:cNvPr id="4" name="Text Placeholder 3"/>
           <p:cNvSpPr>
             <a:spLocks noGrp="1"/>
           </p:cNvSpPr>
           <p:nvPr>
-            <p:ph type="title"/>
+            <p:ph type="body" sz="quarter" idx="10"/>
           </p:nvPr>
         </p:nvSpPr>
         <p:spPr>
           <a:xfrm>
-            <a:off x="286962" y="1270357"/>
-            <a:ext cx="5378548" cy="1763530"/>
+            <a:off x="269239" y="1189177"/>
+            <a:ext cx="11653523" cy="4709944"/>
           </a:xfrm>
         </p:spPr>
         <p:txBody>
+          <a:bodyPr vert="horz" wrap="square" lIns="146304" tIns="91440" rIns="146304" bIns="91440" rtlCol="0" anchor="t">
+            <a:spAutoFit/>
+          </a:bodyPr>
+          <a:lstStyle/>
+          <a:p>
+            <a:r>
+              <a:rPr lang="en-US" dirty="0">
+                <a:solidFill>
+                  <a:schemeClr val="bg1">
+                    <a:lumMod val="75000"/>
+                  </a:schemeClr>
+                </a:solidFill>
+              </a:rPr>
+              <a:t>Native</a:t>
+            </a:r>
+          </a:p>
+          <a:p>
+            <a:endParaRPr lang="en-US" dirty="0"/>
+          </a:p>
+          <a:p>
+            <a:r>
+              <a:rPr lang="en-US" dirty="0">
+                <a:solidFill>
+                  <a:schemeClr val="bg1">
+                    <a:lumMod val="75000"/>
+                  </a:schemeClr>
+                </a:solidFill>
+              </a:rPr>
+              <a:t>Mobile Web</a:t>
+            </a:r>
+          </a:p>
+          <a:p>
+            <a:endParaRPr lang="en-US" dirty="0">
+              <a:solidFill>
+                <a:schemeClr val="bg1">
+                  <a:lumMod val="75000"/>
+                </a:schemeClr>
+              </a:solidFill>
+              <a:cs typeface="Segoe UI Light"/>
+            </a:endParaRPr>
+          </a:p>
+          <a:p>
+            <a:r>
+              <a:rPr lang="en-US" dirty="0">
+                <a:solidFill>
+                  <a:schemeClr val="bg1">
+                    <a:lumMod val="75000"/>
+                  </a:schemeClr>
+                </a:solidFill>
+              </a:rPr>
+              <a:t>Apache Cordova</a:t>
+            </a:r>
+          </a:p>
+          <a:p>
+            <a:endParaRPr lang="en-US" dirty="0">
+              <a:solidFill>
+                <a:schemeClr val="bg1">
+                  <a:lumMod val="75000"/>
+                </a:schemeClr>
+              </a:solidFill>
+              <a:cs typeface="Segoe UI Light"/>
+            </a:endParaRPr>
+          </a:p>
+          <a:p>
+            <a:r>
+              <a:rPr lang="en-US" b="1" dirty="0"/>
+              <a:t>Telerik Platform</a:t>
+            </a:r>
+          </a:p>
+        </p:txBody>
+      </p:sp>
+      <p:sp>
+        <p:nvSpPr>
+          <p:cNvPr id="3" name="Title 2"/>
+          <p:cNvSpPr>
+            <a:spLocks noGrp="1"/>
+          </p:cNvSpPr>
+          <p:nvPr>
+            <p:ph type="title"/>
+          </p:nvPr>
+        </p:nvSpPr>
+        <p:spPr/>
+        <p:txBody>
           <a:bodyPr/>
           <a:lstStyle/>
           <a:p>
             <a:r>
-              <a:rPr lang="en-US" sz="5400" dirty="0">
-                <a:solidFill>
-                  <a:srgbClr val="FFFFFF"/>
-                </a:solidFill>
-                <a:cs typeface="Segoe UI Light"/>
-              </a:rPr>
-              <a:t>Gartner's</a:t>
-            </a:r>
-            <a:br>
-              <a:rPr lang="en-US" sz="5400" dirty="0">
-                <a:solidFill>
-                  <a:srgbClr val="FFFFFF"/>
-                </a:solidFill>
-                <a:cs typeface="Segoe UI Light"/>
-              </a:rPr>
-            </a:br>
-            <a:r>
-              <a:rPr lang="en-US" sz="5400">
-                <a:solidFill>
-                  <a:srgbClr val="FFFFFF"/>
-                </a:solidFill>
-                <a:cs typeface="Segoe UI Light"/>
-              </a:rPr>
-              <a:t>Magic Quadrant</a:t>
-            </a:r>
-          </a:p>
-        </p:txBody>
-      </p:sp>
-      <p:pic>
-        <p:nvPicPr>
-          <p:cNvPr id="5" name="Picture Placeholder 4" descr="Screenshot_2015-06-06-14-48-13-2.jpg"/>
-          <p:cNvPicPr>
-            <a:picLocks noGrp="1" noChangeAspect="1"/>
-          </p:cNvPicPr>
-          <p:nvPr>
-            <p:ph type="pic" sz="quarter" idx="10"/>
-          </p:nvPr>
-        </p:nvPicPr>
-        <p:blipFill>
-          <a:blip r:embed="rId3"/>
-          <a:srcRect l="4616" r="4616"/>
-          <a:stretch>
-            <a:fillRect/>
-          </a:stretch>
-        </p:blipFill>
+              <a:rPr lang="en-US" dirty="0" err="1" smtClean="0"/>
+              <a:t>Xamarin</a:t>
+            </a:r>
+            <a:r>
+              <a:rPr lang="en-US" dirty="0" smtClean="0"/>
+              <a:t> vs. Alternatives</a:t>
+            </a:r>
+            <a:endParaRPr lang="en-US" dirty="0"/>
+          </a:p>
+        </p:txBody>
+      </p:sp>
+      <p:sp>
+        <p:nvSpPr>
+          <p:cNvPr id="2" name="TextBox 1"/>
+          <p:cNvSpPr txBox="1"/>
+          <p:nvPr/>
+        </p:nvSpPr>
         <p:spPr>
           <a:xfrm>
-            <a:off x="6116653" y="283534"/>
-            <a:ext cx="5848409" cy="6324786"/>
+            <a:off x="4954137" y="1189176"/>
+            <a:ext cx="6968625" cy="2219069"/>
           </a:xfrm>
-        </p:spPr>
-      </p:pic>
-      <p:sp>
-        <p:nvSpPr>
-          <p:cNvPr id="3" name="Rounded Rectangle 2"/>
-          <p:cNvSpPr/>
-          <p:nvPr/>
-        </p:nvSpPr>
-        <p:spPr bwMode="auto">
-          <a:xfrm>
-            <a:off x="9471546" y="3357083"/>
-            <a:ext cx="832514" cy="368489"/>
-          </a:xfrm>
-          <a:prstGeom prst="roundRect">
+          <a:prstGeom prst="rect">
             <a:avLst/>
           </a:prstGeom>
-          <a:solidFill>
-            <a:srgbClr val="FFFF00">
-              <a:alpha val="20000"/>
-            </a:srgbClr>
-          </a:solidFill>
-          <a:ln>
-            <a:noFill/>
-            <a:headEnd type="none" w="med" len="med"/>
-            <a:tailEnd type="none" w="med" len="med"/>
-          </a:ln>
-          <a:effectLst/>
+          <a:noFill/>
         </p:spPr>
-        <p:style>
-          <a:lnRef idx="1">
-            <a:schemeClr val="accent2"/>
-          </a:lnRef>
-          <a:fillRef idx="3">
-            <a:schemeClr val="accent2"/>
-          </a:fillRef>
-          <a:effectRef idx="2">
-            <a:schemeClr val="accent2"/>
-          </a:effectRef>
-          <a:fontRef idx="minor">
-            <a:schemeClr val="lt1"/>
-          </a:fontRef>
-        </p:style>
-        <p:txBody>
-          <a:bodyPr rot="0" spcFirstLastPara="0" vertOverflow="overflow" horzOverflow="overflow" vert="horz" wrap="square" lIns="182880" tIns="146304" rIns="182880" bIns="146304" numCol="1" spcCol="0" rtlCol="0" fromWordArt="0" anchor="t" anchorCtr="0" forceAA="0" compatLnSpc="1">
-            <a:prstTxWarp prst="textNoShape">
-              <a:avLst/>
-            </a:prstTxWarp>
-            <a:noAutofit/>
+        <p:txBody>
+          <a:bodyPr wrap="square" lIns="182880" tIns="146304" rIns="182880" bIns="146304" rtlCol="0">
+            <a:spAutoFit/>
           </a:bodyPr>
           <a:lstStyle/>
           <a:p>
-            <a:pPr algn="ctr" defTabSz="932472" fontAlgn="base">
+            <a:pPr marL="342900" indent="-342900">
               <a:lnSpc>
-                <a:spcPct val="90000"/>
+                <a:spcPct val="150000"/>
               </a:lnSpc>
-              <a:spcBef>
-                <a:spcPct val="0"/>
-              </a:spcBef>
               <a:spcAft>
-                <a:spcPct val="0"/>
+                <a:spcPts val="600"/>
               </a:spcAft>
+              <a:buFont typeface="Arial" panose="020B0604020202020204" pitchFamily="34" charset="0"/>
+              <a:buChar char="•"/>
             </a:pPr>
-            <a:endParaRPr lang="en-US" sz="2400" dirty="0" err="1" smtClean="0">
-              <a:gradFill>
-                <a:gsLst>
-                  <a:gs pos="0">
-                    <a:srgbClr val="FFFFFF"/>
-                  </a:gs>
-                  <a:gs pos="100000">
-                    <a:srgbClr val="FFFFFF"/>
-                  </a:gs>
-                </a:gsLst>
-                <a:lin ang="5400000" scaled="0"/>
-              </a:gradFill>
-              <a:ea typeface="Segoe UI" pitchFamily="34" charset="0"/>
-              <a:cs typeface="Segoe UI" pitchFamily="34" charset="0"/>
+            <a:r>
+              <a:rPr lang="en-US" sz="4000" dirty="0" smtClean="0">
+                <a:solidFill>
+                  <a:schemeClr val="bg1"/>
+                </a:solidFill>
+              </a:rPr>
+              <a:t>Browser-based IDE</a:t>
+            </a:r>
+          </a:p>
+          <a:p>
+            <a:pPr marL="342900" indent="-342900">
+              <a:lnSpc>
+                <a:spcPct val="150000"/>
+              </a:lnSpc>
+              <a:spcAft>
+                <a:spcPts val="600"/>
+              </a:spcAft>
+              <a:buFont typeface="Arial" panose="020B0604020202020204" pitchFamily="34" charset="0"/>
+              <a:buChar char="•"/>
+            </a:pPr>
+            <a:r>
+              <a:rPr lang="en-US" sz="4000" dirty="0" smtClean="0">
+                <a:solidFill>
+                  <a:schemeClr val="bg1"/>
+                </a:solidFill>
+              </a:rPr>
+              <a:t>HTML, </a:t>
+            </a:r>
+            <a:r>
+              <a:rPr lang="en-US" sz="4000" dirty="0" err="1" smtClean="0">
+                <a:solidFill>
+                  <a:schemeClr val="bg1"/>
+                </a:solidFill>
+              </a:rPr>
+              <a:t>Javascript</a:t>
+            </a:r>
+            <a:endParaRPr lang="en-US" sz="4000" dirty="0" smtClean="0">
+              <a:solidFill>
+                <a:schemeClr val="bg1"/>
+              </a:solidFill>
             </a:endParaRPr>
           </a:p>
         </p:txBody>
@@ -27117,7 +27627,7 @@
     </p:spTree>
     <p:extLst>
       <p:ext uri="{BB962C8B-B14F-4D97-AF65-F5344CB8AC3E}">
-        <p14:creationId xmlns:p14="http://schemas.microsoft.com/office/powerpoint/2010/main" val="3025917015"/>
+        <p14:creationId xmlns:p14="http://schemas.microsoft.com/office/powerpoint/2010/main" val="626003694"/>
       </p:ext>
     </p:extLst>
   </p:cSld>
@@ -27127,6 +27637,13 @@
   <p:transition>
     <p:fade/>
   </p:transition>
+  <p:timing>
+    <p:tnLst>
+      <p:par>
+        <p:cTn id="1" dur="indefinite" restart="never" nodeType="tmRoot"/>
+      </p:par>
+    </p:tnLst>
+  </p:timing>
 </p:sld>
 </file>
 
@@ -27501,6 +28018,860 @@
 <file path=ppt/slides/slide20.xml><?xml version="1.0" encoding="utf-8"?>
 <p:sld xmlns:a="http://schemas.openxmlformats.org/drawingml/2006/main" xmlns:r="http://schemas.openxmlformats.org/officeDocument/2006/relationships" xmlns:p="http://schemas.openxmlformats.org/presentationml/2006/main">
   <p:cSld>
+    <p:spTree>
+      <p:nvGrpSpPr>
+        <p:cNvPr id="1" name=""/>
+        <p:cNvGrpSpPr/>
+        <p:nvPr/>
+      </p:nvGrpSpPr>
+      <p:grpSpPr>
+        <a:xfrm>
+          <a:off x="0" y="0"/>
+          <a:ext cx="0" cy="0"/>
+          <a:chOff x="0" y="0"/>
+          <a:chExt cx="0" cy="0"/>
+        </a:xfrm>
+      </p:grpSpPr>
+      <p:sp>
+        <p:nvSpPr>
+          <p:cNvPr id="4" name="Text Placeholder 3"/>
+          <p:cNvSpPr>
+            <a:spLocks noGrp="1"/>
+          </p:cNvSpPr>
+          <p:nvPr>
+            <p:ph type="body" sz="quarter" idx="10"/>
+          </p:nvPr>
+        </p:nvSpPr>
+        <p:spPr>
+          <a:xfrm>
+            <a:off x="269239" y="1189177"/>
+            <a:ext cx="11653523" cy="4709944"/>
+          </a:xfrm>
+        </p:spPr>
+        <p:txBody>
+          <a:bodyPr vert="horz" wrap="square" lIns="146304" tIns="91440" rIns="146304" bIns="91440" rtlCol="0" anchor="t">
+            <a:spAutoFit/>
+          </a:bodyPr>
+          <a:lstStyle/>
+          <a:p>
+            <a:r>
+              <a:rPr lang="en-US" dirty="0">
+                <a:solidFill>
+                  <a:schemeClr val="bg1">
+                    <a:lumMod val="75000"/>
+                  </a:schemeClr>
+                </a:solidFill>
+              </a:rPr>
+              <a:t>Native</a:t>
+            </a:r>
+          </a:p>
+          <a:p>
+            <a:endParaRPr lang="en-US" dirty="0"/>
+          </a:p>
+          <a:p>
+            <a:r>
+              <a:rPr lang="en-US" dirty="0">
+                <a:solidFill>
+                  <a:schemeClr val="bg1">
+                    <a:lumMod val="75000"/>
+                  </a:schemeClr>
+                </a:solidFill>
+              </a:rPr>
+              <a:t>Mobile Web</a:t>
+            </a:r>
+          </a:p>
+          <a:p>
+            <a:endParaRPr lang="en-US" dirty="0">
+              <a:solidFill>
+                <a:schemeClr val="bg1">
+                  <a:lumMod val="75000"/>
+                </a:schemeClr>
+              </a:solidFill>
+              <a:cs typeface="Segoe UI Light"/>
+            </a:endParaRPr>
+          </a:p>
+          <a:p>
+            <a:r>
+              <a:rPr lang="en-US" dirty="0">
+                <a:solidFill>
+                  <a:schemeClr val="bg1">
+                    <a:lumMod val="75000"/>
+                  </a:schemeClr>
+                </a:solidFill>
+              </a:rPr>
+              <a:t>Apache Cordova</a:t>
+            </a:r>
+          </a:p>
+          <a:p>
+            <a:endParaRPr lang="en-US" dirty="0">
+              <a:solidFill>
+                <a:schemeClr val="bg1">
+                  <a:lumMod val="75000"/>
+                </a:schemeClr>
+              </a:solidFill>
+              <a:cs typeface="Segoe UI Light"/>
+            </a:endParaRPr>
+          </a:p>
+          <a:p>
+            <a:r>
+              <a:rPr lang="en-US" b="1" dirty="0"/>
+              <a:t>Telerik Platform</a:t>
+            </a:r>
+          </a:p>
+        </p:txBody>
+      </p:sp>
+      <p:sp>
+        <p:nvSpPr>
+          <p:cNvPr id="3" name="Title 2"/>
+          <p:cNvSpPr>
+            <a:spLocks noGrp="1"/>
+          </p:cNvSpPr>
+          <p:nvPr>
+            <p:ph type="title"/>
+          </p:nvPr>
+        </p:nvSpPr>
+        <p:spPr/>
+        <p:txBody>
+          <a:bodyPr/>
+          <a:lstStyle/>
+          <a:p>
+            <a:r>
+              <a:rPr lang="en-US" dirty="0" err="1" smtClean="0"/>
+              <a:t>Xamarin</a:t>
+            </a:r>
+            <a:r>
+              <a:rPr lang="en-US" dirty="0" smtClean="0"/>
+              <a:t> vs. Alternatives</a:t>
+            </a:r>
+            <a:endParaRPr lang="en-US" dirty="0"/>
+          </a:p>
+        </p:txBody>
+      </p:sp>
+      <p:sp>
+        <p:nvSpPr>
+          <p:cNvPr id="2" name="TextBox 1"/>
+          <p:cNvSpPr txBox="1"/>
+          <p:nvPr/>
+        </p:nvSpPr>
+        <p:spPr>
+          <a:xfrm>
+            <a:off x="4954137" y="1189176"/>
+            <a:ext cx="6968625" cy="5219891"/>
+          </a:xfrm>
+          <a:prstGeom prst="rect">
+            <a:avLst/>
+          </a:prstGeom>
+          <a:noFill/>
+        </p:spPr>
+        <p:txBody>
+          <a:bodyPr wrap="square" lIns="182880" tIns="146304" rIns="182880" bIns="146304" rtlCol="0">
+            <a:spAutoFit/>
+          </a:bodyPr>
+          <a:lstStyle/>
+          <a:p>
+            <a:pPr marL="342900" indent="-342900">
+              <a:lnSpc>
+                <a:spcPct val="150000"/>
+              </a:lnSpc>
+              <a:spcAft>
+                <a:spcPts val="600"/>
+              </a:spcAft>
+              <a:buFont typeface="Arial" panose="020B0604020202020204" pitchFamily="34" charset="0"/>
+              <a:buChar char="•"/>
+            </a:pPr>
+            <a:r>
+              <a:rPr lang="en-US" sz="4000" dirty="0" smtClean="0">
+                <a:solidFill>
+                  <a:schemeClr val="bg1"/>
+                </a:solidFill>
+              </a:rPr>
+              <a:t>Low </a:t>
+            </a:r>
+            <a:r>
+              <a:rPr lang="en-US" sz="4000" dirty="0">
+                <a:solidFill>
+                  <a:schemeClr val="bg1"/>
+                </a:solidFill>
+              </a:rPr>
+              <a:t>learning </a:t>
+            </a:r>
+            <a:r>
+              <a:rPr lang="en-US" sz="4000" dirty="0" smtClean="0">
+                <a:solidFill>
+                  <a:schemeClr val="bg1"/>
+                </a:solidFill>
+              </a:rPr>
+              <a:t>curve</a:t>
+            </a:r>
+          </a:p>
+          <a:p>
+            <a:pPr marL="342900" indent="-342900">
+              <a:lnSpc>
+                <a:spcPct val="150000"/>
+              </a:lnSpc>
+              <a:spcAft>
+                <a:spcPts val="600"/>
+              </a:spcAft>
+              <a:buFont typeface="Arial" panose="020B0604020202020204" pitchFamily="34" charset="0"/>
+              <a:buChar char="•"/>
+            </a:pPr>
+            <a:r>
+              <a:rPr lang="en-US" sz="4000" dirty="0" smtClean="0">
+                <a:solidFill>
+                  <a:schemeClr val="bg1"/>
+                </a:solidFill>
+              </a:rPr>
+              <a:t>Less mature</a:t>
+            </a:r>
+            <a:endParaRPr lang="en-US" sz="4000" dirty="0">
+              <a:solidFill>
+                <a:schemeClr val="bg1"/>
+              </a:solidFill>
+            </a:endParaRPr>
+          </a:p>
+          <a:p>
+            <a:pPr marL="342900" indent="-342900">
+              <a:lnSpc>
+                <a:spcPct val="150000"/>
+              </a:lnSpc>
+              <a:spcAft>
+                <a:spcPts val="600"/>
+              </a:spcAft>
+              <a:buFont typeface="Arial" panose="020B0604020202020204" pitchFamily="34" charset="0"/>
+              <a:buChar char="•"/>
+            </a:pPr>
+            <a:r>
+              <a:rPr lang="en-US" sz="4000" dirty="0" smtClean="0">
+                <a:solidFill>
+                  <a:schemeClr val="bg1"/>
+                </a:solidFill>
+              </a:rPr>
+              <a:t>Moderate device control</a:t>
+            </a:r>
+          </a:p>
+          <a:p>
+            <a:pPr marL="342900" indent="-342900">
+              <a:lnSpc>
+                <a:spcPct val="150000"/>
+              </a:lnSpc>
+              <a:spcAft>
+                <a:spcPts val="600"/>
+              </a:spcAft>
+              <a:buFont typeface="Arial" panose="020B0604020202020204" pitchFamily="34" charset="0"/>
+              <a:buChar char="•"/>
+            </a:pPr>
+            <a:r>
+              <a:rPr lang="en-US" sz="4000" dirty="0" smtClean="0">
+                <a:solidFill>
+                  <a:schemeClr val="bg1"/>
+                </a:solidFill>
+              </a:rPr>
+              <a:t>Highly shared code</a:t>
+            </a:r>
+          </a:p>
+          <a:p>
+            <a:pPr marL="342900" indent="-342900">
+              <a:lnSpc>
+                <a:spcPct val="150000"/>
+              </a:lnSpc>
+              <a:spcAft>
+                <a:spcPts val="600"/>
+              </a:spcAft>
+              <a:buFont typeface="Arial" panose="020B0604020202020204" pitchFamily="34" charset="0"/>
+              <a:buChar char="•"/>
+            </a:pPr>
+            <a:r>
+              <a:rPr lang="en-US" sz="4000" dirty="0" smtClean="0">
+                <a:solidFill>
+                  <a:schemeClr val="bg1"/>
+                </a:solidFill>
+              </a:rPr>
+              <a:t>Offline execution</a:t>
+            </a:r>
+          </a:p>
+        </p:txBody>
+      </p:sp>
+    </p:spTree>
+    <p:extLst>
+      <p:ext uri="{BB962C8B-B14F-4D97-AF65-F5344CB8AC3E}">
+        <p14:creationId xmlns:p14="http://schemas.microsoft.com/office/powerpoint/2010/main" val="696946581"/>
+      </p:ext>
+    </p:extLst>
+  </p:cSld>
+  <p:clrMapOvr>
+    <a:masterClrMapping/>
+  </p:clrMapOvr>
+  <p:transition>
+    <p:fade/>
+  </p:transition>
+  <p:timing>
+    <p:tnLst>
+      <p:par>
+        <p:cTn id="1" dur="indefinite" restart="never" nodeType="tmRoot"/>
+      </p:par>
+    </p:tnLst>
+  </p:timing>
+</p:sld>
+</file>
+
+<file path=ppt/slides/slide21.xml><?xml version="1.0" encoding="utf-8"?>
+<p:sld xmlns:a="http://schemas.openxmlformats.org/drawingml/2006/main" xmlns:r="http://schemas.openxmlformats.org/officeDocument/2006/relationships" xmlns:p="http://schemas.openxmlformats.org/presentationml/2006/main">
+  <p:cSld>
+    <p:bg>
+      <p:bgPr>
+        <a:solidFill>
+          <a:schemeClr val="accent1"/>
+        </a:solidFill>
+        <a:effectLst/>
+      </p:bgPr>
+    </p:bg>
+    <p:spTree>
+      <p:nvGrpSpPr>
+        <p:cNvPr id="1" name=""/>
+        <p:cNvGrpSpPr/>
+        <p:nvPr/>
+      </p:nvGrpSpPr>
+      <p:grpSpPr>
+        <a:xfrm>
+          <a:off x="0" y="0"/>
+          <a:ext cx="0" cy="0"/>
+          <a:chOff x="0" y="0"/>
+          <a:chExt cx="0" cy="0"/>
+        </a:xfrm>
+      </p:grpSpPr>
+      <p:sp>
+        <p:nvSpPr>
+          <p:cNvPr id="4" name="Title 3"/>
+          <p:cNvSpPr>
+            <a:spLocks noGrp="1"/>
+          </p:cNvSpPr>
+          <p:nvPr>
+            <p:ph type="title"/>
+          </p:nvPr>
+        </p:nvSpPr>
+        <p:spPr>
+          <a:xfrm>
+            <a:off x="5805675" y="1217195"/>
+            <a:ext cx="6117087" cy="922690"/>
+          </a:xfrm>
+        </p:spPr>
+        <p:txBody>
+          <a:bodyPr/>
+          <a:lstStyle/>
+          <a:p>
+            <a:r>
+              <a:rPr lang="en-US" sz="5400" dirty="0" err="1" smtClean="0">
+                <a:solidFill>
+                  <a:srgbClr val="FFFFFF"/>
+                </a:solidFill>
+              </a:rPr>
+              <a:t>ThoughtWorks</a:t>
+            </a:r>
+            <a:r>
+              <a:rPr lang="en-US" sz="5400" dirty="0" smtClean="0">
+                <a:solidFill>
+                  <a:srgbClr val="FFFFFF"/>
+                </a:solidFill>
+              </a:rPr>
+              <a:t> Radar</a:t>
+            </a:r>
+            <a:endParaRPr lang="en-US" sz="5400" dirty="0">
+              <a:solidFill>
+                <a:srgbClr val="FFFFFF"/>
+              </a:solidFill>
+            </a:endParaRPr>
+          </a:p>
+        </p:txBody>
+      </p:sp>
+      <p:pic>
+        <p:nvPicPr>
+          <p:cNvPr id="6" name="Picture Placeholder 5"/>
+          <p:cNvPicPr>
+            <a:picLocks noGrp="1" noChangeAspect="1"/>
+          </p:cNvPicPr>
+          <p:nvPr>
+            <p:ph type="pic" sz="quarter" idx="10"/>
+          </p:nvPr>
+        </p:nvPicPr>
+        <p:blipFill>
+          <a:blip r:embed="rId3">
+            <a:extLst>
+              <a:ext uri="{28A0092B-C50C-407E-A947-70E740481C1C}">
+                <a14:useLocalDpi xmlns:a14="http://schemas.microsoft.com/office/drawing/2010/main" val="0"/>
+              </a:ext>
+            </a:extLst>
+          </a:blip>
+          <a:srcRect l="7759" r="7759"/>
+          <a:stretch>
+            <a:fillRect/>
+          </a:stretch>
+        </p:blipFill>
+        <p:spPr>
+          <a:xfrm>
+            <a:off x="329939" y="801279"/>
+            <a:ext cx="5475736" cy="5552388"/>
+          </a:xfrm>
+        </p:spPr>
+      </p:pic>
+      <p:sp>
+        <p:nvSpPr>
+          <p:cNvPr id="7" name="TextBox 6"/>
+          <p:cNvSpPr txBox="1"/>
+          <p:nvPr/>
+        </p:nvSpPr>
+        <p:spPr>
+          <a:xfrm>
+            <a:off x="6540118" y="2362333"/>
+            <a:ext cx="4648199" cy="923330"/>
+          </a:xfrm>
+          <a:prstGeom prst="rect">
+            <a:avLst/>
+          </a:prstGeom>
+          <a:noFill/>
+        </p:spPr>
+        <p:txBody>
+          <a:bodyPr wrap="square" rtlCol="0">
+            <a:spAutoFit/>
+          </a:bodyPr>
+          <a:lstStyle/>
+          <a:p>
+            <a:r>
+              <a:rPr lang="en-US" dirty="0">
+                <a:solidFill>
+                  <a:srgbClr val="FFFFFF"/>
+                </a:solidFill>
+              </a:rPr>
+              <a:t>We are excited by the progress made by </a:t>
+            </a:r>
+            <a:r>
+              <a:rPr lang="en-US" b="1" dirty="0" err="1">
+                <a:solidFill>
+                  <a:srgbClr val="FFFFFF"/>
+                </a:solidFill>
+              </a:rPr>
+              <a:t>Xamarin</a:t>
+            </a:r>
+            <a:r>
+              <a:rPr lang="en-US" dirty="0">
+                <a:solidFill>
+                  <a:srgbClr val="FFFFFF"/>
+                </a:solidFill>
+              </a:rPr>
+              <a:t> in offering a solid choice for building cross-platform mobile apps</a:t>
+            </a:r>
+            <a:r>
+              <a:rPr lang="en-US" dirty="0" smtClean="0">
+                <a:solidFill>
+                  <a:srgbClr val="FFFFFF"/>
+                </a:solidFill>
+              </a:rPr>
+              <a:t>.</a:t>
+            </a:r>
+          </a:p>
+        </p:txBody>
+      </p:sp>
+      <p:sp>
+        <p:nvSpPr>
+          <p:cNvPr id="8" name="TextBox 7"/>
+          <p:cNvSpPr txBox="1"/>
+          <p:nvPr/>
+        </p:nvSpPr>
+        <p:spPr>
+          <a:xfrm>
+            <a:off x="6540118" y="3508112"/>
+            <a:ext cx="4495800" cy="1631216"/>
+          </a:xfrm>
+          <a:prstGeom prst="rect">
+            <a:avLst/>
+          </a:prstGeom>
+          <a:noFill/>
+        </p:spPr>
+        <p:txBody>
+          <a:bodyPr wrap="square" rtlCol="0">
+            <a:spAutoFit/>
+          </a:bodyPr>
+          <a:lstStyle/>
+          <a:p>
+            <a:r>
+              <a:rPr lang="en-US" sz="1000" dirty="0">
+                <a:solidFill>
+                  <a:srgbClr val="FFFFFF"/>
+                </a:solidFill>
+              </a:rPr>
+              <a:t>It supports C# and F# as the primary languages with bindings to platform specific SDKs and the Mono runtime environment that works across iOS, Android and Windows Phone. Applications are compiled to native code giving apps a more native look and feel. When using this toolset, it is imperative that the platform specific UI tier be separated from the rest of the tiers to ensure code reuse across different platforms. The recent open-sourcing of the .NET platform should be beneficial for </a:t>
+            </a:r>
+            <a:r>
+              <a:rPr lang="en-US" sz="1000" b="1" dirty="0" err="1">
+                <a:solidFill>
+                  <a:srgbClr val="FFFFFF"/>
+                </a:solidFill>
+              </a:rPr>
+              <a:t>Xamarin</a:t>
+            </a:r>
+            <a:r>
+              <a:rPr lang="en-US" sz="1000" dirty="0">
+                <a:solidFill>
+                  <a:srgbClr val="FFFFFF"/>
+                </a:solidFill>
+              </a:rPr>
+              <a:t> both in allowing access to a broader set of .NET tooling and also making development easier on other operating systems. </a:t>
+            </a:r>
+          </a:p>
+          <a:p>
+            <a:endParaRPr lang="en-US" sz="1000" dirty="0">
+              <a:solidFill>
+                <a:srgbClr val="FFFFFF"/>
+              </a:solidFill>
+            </a:endParaRPr>
+          </a:p>
+        </p:txBody>
+      </p:sp>
+    </p:spTree>
+    <p:extLst>
+      <p:ext uri="{BB962C8B-B14F-4D97-AF65-F5344CB8AC3E}">
+        <p14:creationId xmlns:p14="http://schemas.microsoft.com/office/powerpoint/2010/main" val="3752299454"/>
+      </p:ext>
+    </p:extLst>
+  </p:cSld>
+  <p:clrMapOvr>
+    <a:masterClrMapping/>
+  </p:clrMapOvr>
+  <p:transition>
+    <p:fade/>
+  </p:transition>
+  <p:timing>
+    <p:tnLst>
+      <p:par>
+        <p:cTn id="1" dur="indefinite" restart="never" nodeType="tmRoot"/>
+      </p:par>
+    </p:tnLst>
+  </p:timing>
+</p:sld>
+</file>
+
+<file path=ppt/slides/slide22.xml><?xml version="1.0" encoding="utf-8"?>
+<p:sld xmlns:a="http://schemas.openxmlformats.org/drawingml/2006/main" xmlns:r="http://schemas.openxmlformats.org/officeDocument/2006/relationships" xmlns:p="http://schemas.openxmlformats.org/presentationml/2006/main">
+  <p:cSld>
+    <p:bg>
+      <p:bgPr>
+        <a:solidFill>
+          <a:schemeClr val="accent1"/>
+        </a:solidFill>
+        <a:effectLst/>
+      </p:bgPr>
+    </p:bg>
+    <p:spTree>
+      <p:nvGrpSpPr>
+        <p:cNvPr id="1" name=""/>
+        <p:cNvGrpSpPr/>
+        <p:nvPr/>
+      </p:nvGrpSpPr>
+      <p:grpSpPr>
+        <a:xfrm>
+          <a:off x="0" y="0"/>
+          <a:ext cx="0" cy="0"/>
+          <a:chOff x="0" y="0"/>
+          <a:chExt cx="0" cy="0"/>
+        </a:xfrm>
+      </p:grpSpPr>
+      <p:sp>
+        <p:nvSpPr>
+          <p:cNvPr id="2" name="Title 1"/>
+          <p:cNvSpPr>
+            <a:spLocks noGrp="1"/>
+          </p:cNvSpPr>
+          <p:nvPr>
+            <p:ph type="title"/>
+          </p:nvPr>
+        </p:nvSpPr>
+        <p:spPr>
+          <a:xfrm>
+            <a:off x="286962" y="1270357"/>
+            <a:ext cx="5378548" cy="1763530"/>
+          </a:xfrm>
+        </p:spPr>
+        <p:txBody>
+          <a:bodyPr/>
+          <a:lstStyle/>
+          <a:p>
+            <a:r>
+              <a:rPr lang="en-US" sz="5400" dirty="0">
+                <a:solidFill>
+                  <a:srgbClr val="FFFFFF"/>
+                </a:solidFill>
+                <a:cs typeface="Segoe UI Light"/>
+              </a:rPr>
+              <a:t>Gartner's</a:t>
+            </a:r>
+            <a:br>
+              <a:rPr lang="en-US" sz="5400" dirty="0">
+                <a:solidFill>
+                  <a:srgbClr val="FFFFFF"/>
+                </a:solidFill>
+                <a:cs typeface="Segoe UI Light"/>
+              </a:rPr>
+            </a:br>
+            <a:r>
+              <a:rPr lang="en-US" sz="5400">
+                <a:solidFill>
+                  <a:srgbClr val="FFFFFF"/>
+                </a:solidFill>
+                <a:cs typeface="Segoe UI Light"/>
+              </a:rPr>
+              <a:t>Magic Quadrant</a:t>
+            </a:r>
+          </a:p>
+        </p:txBody>
+      </p:sp>
+      <p:pic>
+        <p:nvPicPr>
+          <p:cNvPr id="5" name="Picture Placeholder 4" descr="Screenshot_2015-06-06-14-48-13-2.jpg"/>
+          <p:cNvPicPr>
+            <a:picLocks noGrp="1" noChangeAspect="1"/>
+          </p:cNvPicPr>
+          <p:nvPr>
+            <p:ph type="pic" sz="quarter" idx="10"/>
+          </p:nvPr>
+        </p:nvPicPr>
+        <p:blipFill>
+          <a:blip r:embed="rId3"/>
+          <a:srcRect l="4616" r="4616"/>
+          <a:stretch>
+            <a:fillRect/>
+          </a:stretch>
+        </p:blipFill>
+        <p:spPr>
+          <a:xfrm>
+            <a:off x="6116653" y="283534"/>
+            <a:ext cx="5848409" cy="6324786"/>
+          </a:xfrm>
+        </p:spPr>
+      </p:pic>
+    </p:spTree>
+    <p:extLst>
+      <p:ext uri="{BB962C8B-B14F-4D97-AF65-F5344CB8AC3E}">
+        <p14:creationId xmlns:p14="http://schemas.microsoft.com/office/powerpoint/2010/main" val="1198292956"/>
+      </p:ext>
+    </p:extLst>
+  </p:cSld>
+  <p:clrMapOvr>
+    <a:masterClrMapping/>
+  </p:clrMapOvr>
+  <p:transition>
+    <p:fade/>
+  </p:transition>
+  <p:timing>
+    <p:tnLst>
+      <p:par>
+        <p:cTn id="1" dur="indefinite" restart="never" nodeType="tmRoot"/>
+      </p:par>
+    </p:tnLst>
+  </p:timing>
+</p:sld>
+</file>
+
+<file path=ppt/slides/slide23.xml><?xml version="1.0" encoding="utf-8"?>
+<p:sld xmlns:a="http://schemas.openxmlformats.org/drawingml/2006/main" xmlns:r="http://schemas.openxmlformats.org/officeDocument/2006/relationships" xmlns:p="http://schemas.openxmlformats.org/presentationml/2006/main">
+  <p:cSld>
+    <p:bg>
+      <p:bgPr>
+        <a:solidFill>
+          <a:schemeClr val="accent1"/>
+        </a:solidFill>
+        <a:effectLst/>
+      </p:bgPr>
+    </p:bg>
+    <p:spTree>
+      <p:nvGrpSpPr>
+        <p:cNvPr id="1" name=""/>
+        <p:cNvGrpSpPr/>
+        <p:nvPr/>
+      </p:nvGrpSpPr>
+      <p:grpSpPr>
+        <a:xfrm>
+          <a:off x="0" y="0"/>
+          <a:ext cx="0" cy="0"/>
+          <a:chOff x="0" y="0"/>
+          <a:chExt cx="0" cy="0"/>
+        </a:xfrm>
+      </p:grpSpPr>
+      <p:sp>
+        <p:nvSpPr>
+          <p:cNvPr id="2" name="Title 1"/>
+          <p:cNvSpPr>
+            <a:spLocks noGrp="1"/>
+          </p:cNvSpPr>
+          <p:nvPr>
+            <p:ph type="title"/>
+          </p:nvPr>
+        </p:nvSpPr>
+        <p:spPr>
+          <a:xfrm>
+            <a:off x="286962" y="1270357"/>
+            <a:ext cx="5378548" cy="1763530"/>
+          </a:xfrm>
+        </p:spPr>
+        <p:txBody>
+          <a:bodyPr/>
+          <a:lstStyle/>
+          <a:p>
+            <a:r>
+              <a:rPr lang="en-US" sz="5400" dirty="0">
+                <a:solidFill>
+                  <a:srgbClr val="FFFFFF"/>
+                </a:solidFill>
+                <a:cs typeface="Segoe UI Light"/>
+              </a:rPr>
+              <a:t>Gartner's</a:t>
+            </a:r>
+            <a:br>
+              <a:rPr lang="en-US" sz="5400" dirty="0">
+                <a:solidFill>
+                  <a:srgbClr val="FFFFFF"/>
+                </a:solidFill>
+                <a:cs typeface="Segoe UI Light"/>
+              </a:rPr>
+            </a:br>
+            <a:r>
+              <a:rPr lang="en-US" sz="5400">
+                <a:solidFill>
+                  <a:srgbClr val="FFFFFF"/>
+                </a:solidFill>
+                <a:cs typeface="Segoe UI Light"/>
+              </a:rPr>
+              <a:t>Magic Quadrant</a:t>
+            </a:r>
+          </a:p>
+        </p:txBody>
+      </p:sp>
+      <p:pic>
+        <p:nvPicPr>
+          <p:cNvPr id="5" name="Picture Placeholder 4" descr="Screenshot_2015-06-06-14-48-13-2.jpg"/>
+          <p:cNvPicPr>
+            <a:picLocks noGrp="1" noChangeAspect="1"/>
+          </p:cNvPicPr>
+          <p:nvPr>
+            <p:ph type="pic" sz="quarter" idx="10"/>
+          </p:nvPr>
+        </p:nvPicPr>
+        <p:blipFill>
+          <a:blip r:embed="rId3"/>
+          <a:srcRect l="4616" r="4616"/>
+          <a:stretch>
+            <a:fillRect/>
+          </a:stretch>
+        </p:blipFill>
+        <p:spPr>
+          <a:xfrm>
+            <a:off x="6116653" y="283534"/>
+            <a:ext cx="5848409" cy="6324786"/>
+          </a:xfrm>
+        </p:spPr>
+      </p:pic>
+      <p:sp>
+        <p:nvSpPr>
+          <p:cNvPr id="3" name="Rounded Rectangle 2"/>
+          <p:cNvSpPr/>
+          <p:nvPr/>
+        </p:nvSpPr>
+        <p:spPr bwMode="auto">
+          <a:xfrm>
+            <a:off x="9471546" y="3357083"/>
+            <a:ext cx="832514" cy="368489"/>
+          </a:xfrm>
+          <a:prstGeom prst="roundRect">
+            <a:avLst/>
+          </a:prstGeom>
+          <a:solidFill>
+            <a:srgbClr val="FFFF00">
+              <a:alpha val="20000"/>
+            </a:srgbClr>
+          </a:solidFill>
+          <a:ln>
+            <a:noFill/>
+            <a:headEnd type="none" w="med" len="med"/>
+            <a:tailEnd type="none" w="med" len="med"/>
+          </a:ln>
+          <a:effectLst/>
+        </p:spPr>
+        <p:style>
+          <a:lnRef idx="1">
+            <a:schemeClr val="accent2"/>
+          </a:lnRef>
+          <a:fillRef idx="3">
+            <a:schemeClr val="accent2"/>
+          </a:fillRef>
+          <a:effectRef idx="2">
+            <a:schemeClr val="accent2"/>
+          </a:effectRef>
+          <a:fontRef idx="minor">
+            <a:schemeClr val="lt1"/>
+          </a:fontRef>
+        </p:style>
+        <p:txBody>
+          <a:bodyPr rot="0" spcFirstLastPara="0" vertOverflow="overflow" horzOverflow="overflow" vert="horz" wrap="square" lIns="182880" tIns="146304" rIns="182880" bIns="146304" numCol="1" spcCol="0" rtlCol="0" fromWordArt="0" anchor="t" anchorCtr="0" forceAA="0" compatLnSpc="1">
+            <a:prstTxWarp prst="textNoShape">
+              <a:avLst/>
+            </a:prstTxWarp>
+            <a:noAutofit/>
+          </a:bodyPr>
+          <a:lstStyle/>
+          <a:p>
+            <a:pPr algn="ctr" defTabSz="932472" fontAlgn="base">
+              <a:lnSpc>
+                <a:spcPct val="90000"/>
+              </a:lnSpc>
+              <a:spcBef>
+                <a:spcPct val="0"/>
+              </a:spcBef>
+              <a:spcAft>
+                <a:spcPct val="0"/>
+              </a:spcAft>
+            </a:pPr>
+            <a:endParaRPr lang="en-US" sz="2400" dirty="0" err="1" smtClean="0">
+              <a:gradFill>
+                <a:gsLst>
+                  <a:gs pos="0">
+                    <a:srgbClr val="FFFFFF"/>
+                  </a:gs>
+                  <a:gs pos="100000">
+                    <a:srgbClr val="FFFFFF"/>
+                  </a:gs>
+                </a:gsLst>
+                <a:lin ang="5400000" scaled="0"/>
+              </a:gradFill>
+              <a:ea typeface="Segoe UI" pitchFamily="34" charset="0"/>
+              <a:cs typeface="Segoe UI" pitchFamily="34" charset="0"/>
+            </a:endParaRPr>
+          </a:p>
+        </p:txBody>
+      </p:sp>
+    </p:spTree>
+    <p:extLst>
+      <p:ext uri="{BB962C8B-B14F-4D97-AF65-F5344CB8AC3E}">
+        <p14:creationId xmlns:p14="http://schemas.microsoft.com/office/powerpoint/2010/main" val="3025917015"/>
+      </p:ext>
+    </p:extLst>
+  </p:cSld>
+  <p:clrMapOvr>
+    <a:masterClrMapping/>
+  </p:clrMapOvr>
+  <p:transition>
+    <p:fade/>
+  </p:transition>
+  <p:timing>
+    <p:tnLst>
+      <p:par>
+        <p:cTn id="1" dur="indefinite" restart="never" nodeType="tmRoot"/>
+      </p:par>
+    </p:tnLst>
+  </p:timing>
+</p:sld>
+</file>
+
+<file path=ppt/slides/slide24.xml><?xml version="1.0" encoding="utf-8"?>
+<p:sld xmlns:a="http://schemas.openxmlformats.org/drawingml/2006/main" xmlns:r="http://schemas.openxmlformats.org/officeDocument/2006/relationships" xmlns:p="http://schemas.openxmlformats.org/presentationml/2006/main">
+  <p:cSld>
     <p:bg>
       <p:bgPr>
         <a:solidFill>
@@ -27894,10 +29265,17 @@
   <p:transition>
     <p:fade/>
   </p:transition>
+  <p:timing>
+    <p:tnLst>
+      <p:par>
+        <p:cTn id="1" dur="indefinite" restart="never" nodeType="tmRoot"/>
+      </p:par>
+    </p:tnLst>
+  </p:timing>
 </p:sld>
 </file>
 
-<file path=ppt/slides/slide21.xml><?xml version="1.0" encoding="utf-8"?>
+<file path=ppt/slides/slide25.xml><?xml version="1.0" encoding="utf-8"?>
 <p:sld xmlns:a="http://schemas.openxmlformats.org/drawingml/2006/main" xmlns:r="http://schemas.openxmlformats.org/officeDocument/2006/relationships" xmlns:p="http://schemas.openxmlformats.org/presentationml/2006/main">
   <p:cSld>
     <p:bg>
@@ -28170,10 +29548,17 @@
   <p:transition>
     <p:fade/>
   </p:transition>
+  <p:timing>
+    <p:tnLst>
+      <p:par>
+        <p:cTn id="1" dur="indefinite" restart="never" nodeType="tmRoot"/>
+      </p:par>
+    </p:tnLst>
+  </p:timing>
 </p:sld>
 </file>
 
-<file path=ppt/slides/slide22.xml><?xml version="1.0" encoding="utf-8"?>
+<file path=ppt/slides/slide26.xml><?xml version="1.0" encoding="utf-8"?>
 <p:sld xmlns:a="http://schemas.openxmlformats.org/drawingml/2006/main" xmlns:r="http://schemas.openxmlformats.org/officeDocument/2006/relationships" xmlns:p="http://schemas.openxmlformats.org/presentationml/2006/main">
   <p:cSld>
     <p:bg>
@@ -28244,7 +29629,7 @@
             <a:fld id="{0A164282-434E-41D4-9582-783D542A7B68}" type="slidenum">
               <a:rPr lang="en-US" smtClean="0"/>
               <a:pPr/>
-              <a:t>22</a:t>
+              <a:t>26</a:t>
             </a:fld>
             <a:endParaRPr lang="en-US"/>
           </a:p>
@@ -28308,581 +29693,6 @@
     <p:extLst>
       <p:ext uri="{BB962C8B-B14F-4D97-AF65-F5344CB8AC3E}">
         <p14:creationId xmlns:p14="http://schemas.microsoft.com/office/powerpoint/2010/main" val="1162229810"/>
-      </p:ext>
-    </p:extLst>
-  </p:cSld>
-  <p:clrMapOvr>
-    <a:masterClrMapping/>
-  </p:clrMapOvr>
-  <mc:AlternateContent xmlns:mc="http://schemas.openxmlformats.org/markup-compatibility/2006" xmlns:p14="http://schemas.microsoft.com/office/powerpoint/2010/main">
-    <mc:Choice Requires="p14">
-      <p:transition spd="med" p14:dur="700">
-        <p:fade/>
-      </p:transition>
-    </mc:Choice>
-    <mc:Fallback xmlns="">
-      <p:transition spd="med">
-        <p:fade/>
-      </p:transition>
-    </mc:Fallback>
-  </mc:AlternateContent>
-  <p:timing>
-    <p:tnLst>
-      <p:par>
-        <p:cTn id="1" dur="indefinite" restart="never" nodeType="tmRoot"/>
-      </p:par>
-    </p:tnLst>
-  </p:timing>
-</p:sld>
-</file>
-
-<file path=ppt/slides/slide23.xml><?xml version="1.0" encoding="utf-8"?>
-<p:sld xmlns:a="http://schemas.openxmlformats.org/drawingml/2006/main" xmlns:r="http://schemas.openxmlformats.org/officeDocument/2006/relationships" xmlns:p="http://schemas.openxmlformats.org/presentationml/2006/main">
-  <p:cSld>
-    <p:spTree>
-      <p:nvGrpSpPr>
-        <p:cNvPr id="1" name=""/>
-        <p:cNvGrpSpPr/>
-        <p:nvPr/>
-      </p:nvGrpSpPr>
-      <p:grpSpPr>
-        <a:xfrm>
-          <a:off x="0" y="0"/>
-          <a:ext cx="0" cy="0"/>
-          <a:chOff x="0" y="0"/>
-          <a:chExt cx="0" cy="0"/>
-        </a:xfrm>
-      </p:grpSpPr>
-      <p:sp>
-        <p:nvSpPr>
-          <p:cNvPr id="5" name="Title 4"/>
-          <p:cNvSpPr>
-            <a:spLocks noGrp="1"/>
-          </p:cNvSpPr>
-          <p:nvPr>
-            <p:ph type="ctrTitle"/>
-          </p:nvPr>
-        </p:nvSpPr>
-        <p:spPr/>
-        <p:txBody>
-          <a:bodyPr/>
-          <a:lstStyle/>
-          <a:p>
-            <a:r>
-              <a:rPr lang="en-US" smtClean="0"/>
-              <a:t>Demo</a:t>
-            </a:r>
-            <a:endParaRPr lang="en-US" dirty="0"/>
-          </a:p>
-        </p:txBody>
-      </p:sp>
-      <p:sp>
-        <p:nvSpPr>
-          <p:cNvPr id="4" name="Slide Number Placeholder 3"/>
-          <p:cNvSpPr>
-            <a:spLocks noGrp="1"/>
-          </p:cNvSpPr>
-          <p:nvPr>
-            <p:ph type="sldNum" sz="quarter" idx="4294967295"/>
-          </p:nvPr>
-        </p:nvSpPr>
-        <p:spPr>
-          <a:xfrm>
-            <a:off x="9448800" y="6256338"/>
-            <a:ext cx="2743200" cy="365125"/>
-          </a:xfrm>
-        </p:spPr>
-        <p:txBody>
-          <a:bodyPr/>
-          <a:lstStyle/>
-          <a:p>
-            <a:fld id="{0A164282-434E-41D4-9582-783D542A7B68}" type="slidenum">
-              <a:rPr lang="en-US" smtClean="0"/>
-              <a:pPr/>
-              <a:t>23</a:t>
-            </a:fld>
-            <a:endParaRPr lang="en-US"/>
-          </a:p>
-        </p:txBody>
-      </p:sp>
-      <p:sp>
-        <p:nvSpPr>
-          <p:cNvPr id="6" name="TextBox 5"/>
-          <p:cNvSpPr txBox="1"/>
-          <p:nvPr/>
-        </p:nvSpPr>
-        <p:spPr>
-          <a:xfrm>
-            <a:off x="698500" y="4575648"/>
-            <a:ext cx="10020300" cy="369332"/>
-          </a:xfrm>
-          <a:prstGeom prst="rect">
-            <a:avLst/>
-          </a:prstGeom>
-          <a:noFill/>
-        </p:spPr>
-        <p:txBody>
-          <a:bodyPr wrap="square" rtlCol="0">
-            <a:spAutoFit/>
-          </a:bodyPr>
-          <a:lstStyle/>
-          <a:p>
-            <a:r>
-              <a:rPr lang="en-US" dirty="0" smtClean="0">
-                <a:solidFill>
-                  <a:schemeClr val="bg1"/>
-                </a:solidFill>
-              </a:rPr>
-              <a:t>Port Java to C# with </a:t>
-            </a:r>
-            <a:r>
-              <a:rPr lang="en-US" dirty="0" err="1" smtClean="0">
-                <a:solidFill>
-                  <a:schemeClr val="bg1"/>
-                </a:solidFill>
-              </a:rPr>
-              <a:t>Xamarin.Android</a:t>
-            </a:r>
-            <a:endParaRPr lang="en-US" dirty="0">
-              <a:solidFill>
-                <a:schemeClr val="bg1"/>
-              </a:solidFill>
-            </a:endParaRPr>
-          </a:p>
-        </p:txBody>
-      </p:sp>
-    </p:spTree>
-    <p:extLst>
-      <p:ext uri="{BB962C8B-B14F-4D97-AF65-F5344CB8AC3E}">
-        <p14:creationId xmlns:p14="http://schemas.microsoft.com/office/powerpoint/2010/main" val="487250150"/>
-      </p:ext>
-    </p:extLst>
-  </p:cSld>
-  <p:clrMapOvr>
-    <a:masterClrMapping/>
-  </p:clrMapOvr>
-  <mc:AlternateContent xmlns:mc="http://schemas.openxmlformats.org/markup-compatibility/2006" xmlns:p14="http://schemas.microsoft.com/office/powerpoint/2010/main">
-    <mc:Choice Requires="p14">
-      <p:transition spd="med" p14:dur="700">
-        <p:fade/>
-      </p:transition>
-    </mc:Choice>
-    <mc:Fallback xmlns="">
-      <p:transition spd="med">
-        <p:fade/>
-      </p:transition>
-    </mc:Fallback>
-  </mc:AlternateContent>
-  <p:timing>
-    <p:tnLst>
-      <p:par>
-        <p:cTn id="1" dur="indefinite" restart="never" nodeType="tmRoot"/>
-      </p:par>
-    </p:tnLst>
-  </p:timing>
-</p:sld>
-</file>
-
-<file path=ppt/slides/slide24.xml><?xml version="1.0" encoding="utf-8"?>
-<p:sld xmlns:a="http://schemas.openxmlformats.org/drawingml/2006/main" xmlns:r="http://schemas.openxmlformats.org/officeDocument/2006/relationships" xmlns:p="http://schemas.openxmlformats.org/presentationml/2006/main">
-  <p:cSld>
-    <p:spTree>
-      <p:nvGrpSpPr>
-        <p:cNvPr id="1" name=""/>
-        <p:cNvGrpSpPr/>
-        <p:nvPr/>
-      </p:nvGrpSpPr>
-      <p:grpSpPr>
-        <a:xfrm>
-          <a:off x="0" y="0"/>
-          <a:ext cx="0" cy="0"/>
-          <a:chOff x="0" y="0"/>
-          <a:chExt cx="0" cy="0"/>
-        </a:xfrm>
-      </p:grpSpPr>
-      <p:sp>
-        <p:nvSpPr>
-          <p:cNvPr id="5" name="Title 4"/>
-          <p:cNvSpPr>
-            <a:spLocks noGrp="1"/>
-          </p:cNvSpPr>
-          <p:nvPr>
-            <p:ph type="ctrTitle"/>
-          </p:nvPr>
-        </p:nvSpPr>
-        <p:spPr/>
-        <p:txBody>
-          <a:bodyPr/>
-          <a:lstStyle/>
-          <a:p>
-            <a:r>
-              <a:rPr lang="en-US" smtClean="0"/>
-              <a:t>Demo</a:t>
-            </a:r>
-            <a:endParaRPr lang="en-US" dirty="0"/>
-          </a:p>
-        </p:txBody>
-      </p:sp>
-      <p:sp>
-        <p:nvSpPr>
-          <p:cNvPr id="4" name="Slide Number Placeholder 3"/>
-          <p:cNvSpPr>
-            <a:spLocks noGrp="1"/>
-          </p:cNvSpPr>
-          <p:nvPr>
-            <p:ph type="sldNum" sz="quarter" idx="4294967295"/>
-          </p:nvPr>
-        </p:nvSpPr>
-        <p:spPr>
-          <a:xfrm>
-            <a:off x="9448800" y="6256338"/>
-            <a:ext cx="2743200" cy="365125"/>
-          </a:xfrm>
-        </p:spPr>
-        <p:txBody>
-          <a:bodyPr/>
-          <a:lstStyle/>
-          <a:p>
-            <a:fld id="{0A164282-434E-41D4-9582-783D542A7B68}" type="slidenum">
-              <a:rPr lang="en-US" smtClean="0"/>
-              <a:pPr/>
-              <a:t>24</a:t>
-            </a:fld>
-            <a:endParaRPr lang="en-US"/>
-          </a:p>
-        </p:txBody>
-      </p:sp>
-      <p:sp>
-        <p:nvSpPr>
-          <p:cNvPr id="6" name="TextBox 5"/>
-          <p:cNvSpPr txBox="1"/>
-          <p:nvPr/>
-        </p:nvSpPr>
-        <p:spPr>
-          <a:xfrm>
-            <a:off x="698500" y="4575648"/>
-            <a:ext cx="10020300" cy="369332"/>
-          </a:xfrm>
-          <a:prstGeom prst="rect">
-            <a:avLst/>
-          </a:prstGeom>
-          <a:noFill/>
-        </p:spPr>
-        <p:txBody>
-          <a:bodyPr wrap="square" rtlCol="0">
-            <a:spAutoFit/>
-          </a:bodyPr>
-          <a:lstStyle/>
-          <a:p>
-            <a:r>
-              <a:rPr lang="en-US" dirty="0" smtClean="0">
-                <a:solidFill>
-                  <a:schemeClr val="bg1"/>
-                </a:solidFill>
-              </a:rPr>
-              <a:t>Share Common Codebase Across Android, iOS, and Windows Phone</a:t>
-            </a:r>
-            <a:endParaRPr lang="en-US" dirty="0">
-              <a:solidFill>
-                <a:schemeClr val="bg1"/>
-              </a:solidFill>
-            </a:endParaRPr>
-          </a:p>
-        </p:txBody>
-      </p:sp>
-    </p:spTree>
-    <p:extLst>
-      <p:ext uri="{BB962C8B-B14F-4D97-AF65-F5344CB8AC3E}">
-        <p14:creationId xmlns:p14="http://schemas.microsoft.com/office/powerpoint/2010/main" val="246638531"/>
-      </p:ext>
-    </p:extLst>
-  </p:cSld>
-  <p:clrMapOvr>
-    <a:masterClrMapping/>
-  </p:clrMapOvr>
-  <mc:AlternateContent xmlns:mc="http://schemas.openxmlformats.org/markup-compatibility/2006" xmlns:p14="http://schemas.microsoft.com/office/powerpoint/2010/main">
-    <mc:Choice Requires="p14">
-      <p:transition spd="med" p14:dur="700">
-        <p:fade/>
-      </p:transition>
-    </mc:Choice>
-    <mc:Fallback xmlns="">
-      <p:transition spd="med">
-        <p:fade/>
-      </p:transition>
-    </mc:Fallback>
-  </mc:AlternateContent>
-  <p:timing>
-    <p:tnLst>
-      <p:par>
-        <p:cTn id="1" dur="indefinite" restart="never" nodeType="tmRoot"/>
-      </p:par>
-    </p:tnLst>
-  </p:timing>
-</p:sld>
-</file>
-
-<file path=ppt/slides/slide25.xml><?xml version="1.0" encoding="utf-8"?>
-<p:sld xmlns:a="http://schemas.openxmlformats.org/drawingml/2006/main" xmlns:r="http://schemas.openxmlformats.org/officeDocument/2006/relationships" xmlns:p="http://schemas.openxmlformats.org/presentationml/2006/main">
-  <p:cSld>
-    <p:spTree>
-      <p:nvGrpSpPr>
-        <p:cNvPr id="1" name=""/>
-        <p:cNvGrpSpPr/>
-        <p:nvPr/>
-      </p:nvGrpSpPr>
-      <p:grpSpPr>
-        <a:xfrm>
-          <a:off x="0" y="0"/>
-          <a:ext cx="0" cy="0"/>
-          <a:chOff x="0" y="0"/>
-          <a:chExt cx="0" cy="0"/>
-        </a:xfrm>
-      </p:grpSpPr>
-      <p:sp>
-        <p:nvSpPr>
-          <p:cNvPr id="4" name="Text Placeholder 3"/>
-          <p:cNvSpPr>
-            <a:spLocks noGrp="1"/>
-          </p:cNvSpPr>
-          <p:nvPr>
-            <p:ph type="body" sz="quarter" idx="10"/>
-          </p:nvPr>
-        </p:nvSpPr>
-        <p:spPr>
-          <a:xfrm>
-            <a:off x="269239" y="1189177"/>
-            <a:ext cx="11653523" cy="5373651"/>
-          </a:xfrm>
-        </p:spPr>
-        <p:txBody>
-          <a:bodyPr/>
-          <a:lstStyle/>
-          <a:p>
-            <a:r>
-              <a:rPr lang="en-US"/>
-              <a:t>Emulators are fragile</a:t>
-            </a:r>
-          </a:p>
-          <a:p>
-            <a:r>
-              <a:rPr lang="en-US"/>
-              <a:t>Always rebuild all</a:t>
-            </a:r>
-          </a:p>
-          <a:p>
-            <a:r>
-              <a:rPr lang="en-US"/>
-              <a:t>Bad references cause mysterious errors</a:t>
-            </a:r>
-          </a:p>
-          <a:p>
-            <a:r>
-              <a:rPr lang="en-US"/>
-              <a:t>Get to know Nunit-Lite</a:t>
-            </a:r>
-          </a:p>
-          <a:p>
-            <a:endParaRPr lang="en-US"/>
-          </a:p>
-          <a:p>
-            <a:endParaRPr lang="en-US"/>
-          </a:p>
-          <a:p>
-            <a:endParaRPr lang="en-US"/>
-          </a:p>
-          <a:p>
-            <a:endParaRPr lang="en-US"/>
-          </a:p>
-        </p:txBody>
-      </p:sp>
-      <p:sp>
-        <p:nvSpPr>
-          <p:cNvPr id="2" name="Title 1"/>
-          <p:cNvSpPr>
-            <a:spLocks noGrp="1"/>
-          </p:cNvSpPr>
-          <p:nvPr>
-            <p:ph type="title"/>
-          </p:nvPr>
-        </p:nvSpPr>
-        <p:spPr/>
-        <p:txBody>
-          <a:bodyPr/>
-          <a:lstStyle/>
-          <a:p>
-            <a:r>
-              <a:rPr lang="en-US"/>
-              <a:t>Issues</a:t>
-            </a:r>
-          </a:p>
-        </p:txBody>
-      </p:sp>
-    </p:spTree>
-    <p:extLst>
-      <p:ext uri="{BB962C8B-B14F-4D97-AF65-F5344CB8AC3E}">
-        <p14:creationId xmlns:p14="http://schemas.microsoft.com/office/powerpoint/2010/main" val="3645307102"/>
-      </p:ext>
-    </p:extLst>
-  </p:cSld>
-  <p:clrMapOvr>
-    <a:masterClrMapping/>
-  </p:clrMapOvr>
-  <p:transition>
-    <p:fade/>
-  </p:transition>
-</p:sld>
-</file>
-
-<file path=ppt/slides/slide26.xml><?xml version="1.0" encoding="utf-8"?>
-<p:sld xmlns:a="http://schemas.openxmlformats.org/drawingml/2006/main" xmlns:r="http://schemas.openxmlformats.org/officeDocument/2006/relationships" xmlns:p="http://schemas.openxmlformats.org/presentationml/2006/main">
-  <p:cSld>
-    <p:spTree>
-      <p:nvGrpSpPr>
-        <p:cNvPr id="1" name=""/>
-        <p:cNvGrpSpPr/>
-        <p:nvPr/>
-      </p:nvGrpSpPr>
-      <p:grpSpPr>
-        <a:xfrm>
-          <a:off x="0" y="0"/>
-          <a:ext cx="0" cy="0"/>
-          <a:chOff x="0" y="0"/>
-          <a:chExt cx="0" cy="0"/>
-        </a:xfrm>
-      </p:grpSpPr>
-      <p:sp>
-        <p:nvSpPr>
-          <p:cNvPr id="9" name="Title 8"/>
-          <p:cNvSpPr>
-            <a:spLocks noGrp="1"/>
-          </p:cNvSpPr>
-          <p:nvPr>
-            <p:ph type="title"/>
-          </p:nvPr>
-        </p:nvSpPr>
-        <p:spPr/>
-        <p:txBody>
-          <a:bodyPr>
-            <a:normAutofit fontScale="90000"/>
-          </a:bodyPr>
-          <a:lstStyle/>
-          <a:p>
-            <a:r>
-              <a:rPr lang="en-US" dirty="0" smtClean="0">
-                <a:solidFill>
-                  <a:schemeClr val="bg1"/>
-                </a:solidFill>
-              </a:rPr>
-              <a:t>Thank You!</a:t>
-            </a:r>
-            <a:endParaRPr lang="en-US" dirty="0">
-              <a:solidFill>
-                <a:schemeClr val="bg1"/>
-              </a:solidFill>
-            </a:endParaRPr>
-          </a:p>
-        </p:txBody>
-      </p:sp>
-      <p:sp>
-        <p:nvSpPr>
-          <p:cNvPr id="12" name="TextBox 11"/>
-          <p:cNvSpPr txBox="1"/>
-          <p:nvPr/>
-        </p:nvSpPr>
-        <p:spPr>
-          <a:xfrm>
-            <a:off x="603891" y="2541655"/>
-            <a:ext cx="10982632" cy="1446550"/>
-          </a:xfrm>
-          <a:prstGeom prst="rect">
-            <a:avLst/>
-          </a:prstGeom>
-          <a:noFill/>
-        </p:spPr>
-        <p:txBody>
-          <a:bodyPr wrap="square" rtlCol="0">
-            <a:spAutoFit/>
-          </a:bodyPr>
-          <a:lstStyle/>
-          <a:p>
-            <a:pPr algn="ctr"/>
-            <a:r>
-              <a:rPr lang="en-US" sz="3200" dirty="0" smtClean="0">
-                <a:solidFill>
-                  <a:schemeClr val="bg1"/>
-                </a:solidFill>
-              </a:rPr>
-              <a:t>Ken LeFebvre</a:t>
-            </a:r>
-            <a:endParaRPr lang="en-US" sz="3200" dirty="0">
-              <a:solidFill>
-                <a:schemeClr val="bg1"/>
-              </a:solidFill>
-            </a:endParaRPr>
-          </a:p>
-          <a:p>
-            <a:pPr algn="ctr"/>
-            <a:r>
-              <a:rPr lang="en-US" sz="2800" dirty="0" smtClean="0">
-                <a:solidFill>
-                  <a:schemeClr val="bg1"/>
-                </a:solidFill>
-              </a:rPr>
-              <a:t>@</a:t>
-            </a:r>
-            <a:r>
-              <a:rPr lang="en-US" sz="2800" dirty="0" err="1" smtClean="0">
-                <a:solidFill>
-                  <a:schemeClr val="bg1"/>
-                </a:solidFill>
-              </a:rPr>
-              <a:t>kenlefeb</a:t>
-            </a:r>
-            <a:r>
-              <a:rPr lang="en-US" sz="2800" dirty="0" smtClean="0">
-                <a:solidFill>
-                  <a:schemeClr val="bg1"/>
-                </a:solidFill>
-              </a:rPr>
-              <a:t> | linkedin.com/</a:t>
-            </a:r>
-            <a:r>
-              <a:rPr lang="en-US" sz="2800" dirty="0" err="1" smtClean="0">
-                <a:solidFill>
-                  <a:schemeClr val="bg1"/>
-                </a:solidFill>
-              </a:rPr>
-              <a:t>kenlefeb</a:t>
-            </a:r>
-            <a:endParaRPr lang="en-US" sz="2800" dirty="0">
-              <a:solidFill>
-                <a:schemeClr val="bg1"/>
-              </a:solidFill>
-            </a:endParaRPr>
-          </a:p>
-          <a:p>
-            <a:pPr algn="ctr"/>
-            <a:r>
-              <a:rPr lang="en-US" sz="2800" dirty="0" smtClean="0">
-                <a:solidFill>
-                  <a:schemeClr val="bg1"/>
-                </a:solidFill>
-              </a:rPr>
-              <a:t>klefebvre@macropoint.com | www.macropoint.com</a:t>
-            </a:r>
-            <a:endParaRPr lang="en-US" sz="2800" dirty="0">
-              <a:solidFill>
-                <a:schemeClr val="bg1"/>
-              </a:solidFill>
-            </a:endParaRPr>
-          </a:p>
-        </p:txBody>
-      </p:sp>
-    </p:spTree>
-    <p:extLst>
-      <p:ext uri="{BB962C8B-B14F-4D97-AF65-F5344CB8AC3E}">
-        <p14:creationId xmlns:p14="http://schemas.microsoft.com/office/powerpoint/2010/main" val="3478655370"/>
       </p:ext>
     </p:extLst>
   </p:cSld>
@@ -28930,12 +29740,12 @@
       </p:grpSpPr>
       <p:sp>
         <p:nvSpPr>
-          <p:cNvPr id="2" name="Title 1"/>
+          <p:cNvPr id="5" name="Title 4"/>
           <p:cNvSpPr>
             <a:spLocks noGrp="1"/>
           </p:cNvSpPr>
           <p:nvPr>
-            <p:ph type="title"/>
+            <p:ph type="ctrTitle"/>
           </p:nvPr>
         </p:nvSpPr>
         <p:spPr/>
@@ -28943,187 +29753,85 @@
           <a:bodyPr/>
           <a:lstStyle/>
           <a:p>
-            <a:pPr>
-              <a:spcBef>
-                <a:spcPts val="0"/>
-              </a:spcBef>
-              <a:buClr>
-                <a:srgbClr val="505050"/>
-              </a:buClr>
-              <a:buSzPct val="90000"/>
-            </a:pPr>
-            <a:r>
-              <a:rPr lang="en-US" dirty="0" smtClean="0"/>
-              <a:t>July .NET SIG</a:t>
-            </a:r>
-            <a:br>
-              <a:rPr lang="en-US" dirty="0" smtClean="0"/>
-            </a:br>
-            <a:r>
-              <a:rPr lang="en-US" sz="3137" dirty="0">
+            <a:r>
+              <a:rPr lang="en-US" smtClean="0"/>
+              <a:t>Demo</a:t>
+            </a:r>
+            <a:endParaRPr lang="en-US" dirty="0"/>
+          </a:p>
+        </p:txBody>
+      </p:sp>
+      <p:sp>
+        <p:nvSpPr>
+          <p:cNvPr id="4" name="Slide Number Placeholder 3"/>
+          <p:cNvSpPr>
+            <a:spLocks noGrp="1"/>
+          </p:cNvSpPr>
+          <p:nvPr>
+            <p:ph type="sldNum" sz="quarter" idx="4294967295"/>
+          </p:nvPr>
+        </p:nvSpPr>
+        <p:spPr>
+          <a:xfrm>
+            <a:off x="9448800" y="6256338"/>
+            <a:ext cx="2743200" cy="365125"/>
+          </a:xfrm>
+        </p:spPr>
+        <p:txBody>
+          <a:bodyPr/>
+          <a:lstStyle/>
+          <a:p>
+            <a:fld id="{0A164282-434E-41D4-9582-783D542A7B68}" type="slidenum">
+              <a:rPr lang="en-US" smtClean="0"/>
+              <a:pPr/>
+              <a:t>27</a:t>
+            </a:fld>
+            <a:endParaRPr lang="en-US"/>
+          </a:p>
+        </p:txBody>
+      </p:sp>
+      <p:sp>
+        <p:nvSpPr>
+          <p:cNvPr id="6" name="TextBox 5"/>
+          <p:cNvSpPr txBox="1"/>
+          <p:nvPr/>
+        </p:nvSpPr>
+        <p:spPr>
+          <a:xfrm>
+            <a:off x="698500" y="4575648"/>
+            <a:ext cx="10020300" cy="369332"/>
+          </a:xfrm>
+          <a:prstGeom prst="rect">
+            <a:avLst/>
+          </a:prstGeom>
+          <a:noFill/>
+        </p:spPr>
+        <p:txBody>
+          <a:bodyPr wrap="square" rtlCol="0">
+            <a:spAutoFit/>
+          </a:bodyPr>
+          <a:lstStyle/>
+          <a:p>
+            <a:r>
+              <a:rPr lang="en-US" dirty="0" smtClean="0">
                 <a:solidFill>
-                  <a:srgbClr val="FFC000"/>
+                  <a:schemeClr val="bg1"/>
                 </a:solidFill>
               </a:rPr>
-              <a:t>6/9/2015</a:t>
-            </a:r>
-            <a:r>
-              <a:rPr lang="en-US" sz="3137" dirty="0"/>
-              <a:t/>
-            </a:r>
-            <a:br>
-              <a:rPr lang="en-US" sz="3137" dirty="0"/>
-            </a:br>
-            <a:r>
-              <a:rPr lang="en-US" sz="2353" spc="0" dirty="0">
-                <a:ln>
-                  <a:noFill/>
-                </a:ln>
-                <a:gradFill>
-                  <a:gsLst>
-                    <a:gs pos="1250">
-                      <a:srgbClr val="FFFFFF"/>
-                    </a:gs>
-                    <a:gs pos="99000">
-                      <a:srgbClr val="FFFFFF"/>
-                    </a:gs>
-                  </a:gsLst>
-                  <a:lin ang="5400000" scaled="0"/>
-                </a:gradFill>
-                <a:cs typeface="+mn-cs"/>
+              <a:t>Port Java to C# with </a:t>
+            </a:r>
+            <a:r>
+              <a:rPr lang="en-US" dirty="0" err="1" smtClean="0">
+                <a:solidFill>
+                  <a:schemeClr val="bg1"/>
+                </a:solidFill>
               </a:rPr>
-              <a:t>Ken LeFebvre</a:t>
-            </a:r>
-            <a:br>
-              <a:rPr lang="en-US" sz="2353" spc="0" dirty="0">
-                <a:ln>
-                  <a:noFill/>
-                </a:ln>
-                <a:gradFill>
-                  <a:gsLst>
-                    <a:gs pos="1250">
-                      <a:srgbClr val="FFFFFF"/>
-                    </a:gs>
-                    <a:gs pos="99000">
-                      <a:srgbClr val="FFFFFF"/>
-                    </a:gs>
-                  </a:gsLst>
-                  <a:lin ang="5400000" scaled="0"/>
-                </a:gradFill>
-                <a:cs typeface="+mn-cs"/>
-              </a:rPr>
-            </a:br>
-            <a:r>
-              <a:rPr lang="en-US" sz="1176" spc="0" dirty="0">
-                <a:ln>
-                  <a:noFill/>
-                </a:ln>
-                <a:gradFill>
-                  <a:gsLst>
-                    <a:gs pos="1250">
-                      <a:srgbClr val="FFFFFF"/>
-                    </a:gs>
-                    <a:gs pos="99000">
-                      <a:srgbClr val="FFFFFF"/>
-                    </a:gs>
-                  </a:gsLst>
-                  <a:lin ang="5400000" scaled="0"/>
-                </a:gradFill>
-                <a:cs typeface="+mn-cs"/>
-              </a:rPr>
-              <a:t> Bennett Adelson</a:t>
-            </a:r>
-            <a:br>
-              <a:rPr lang="en-US" sz="1176" spc="0" dirty="0">
-                <a:ln>
-                  <a:noFill/>
-                </a:ln>
-                <a:gradFill>
-                  <a:gsLst>
-                    <a:gs pos="1250">
-                      <a:srgbClr val="FFFFFF"/>
-                    </a:gs>
-                    <a:gs pos="99000">
-                      <a:srgbClr val="FFFFFF"/>
-                    </a:gs>
-                  </a:gsLst>
-                  <a:lin ang="5400000" scaled="0"/>
-                </a:gradFill>
-                <a:cs typeface="+mn-cs"/>
-              </a:rPr>
-            </a:br>
-            <a:r>
-              <a:rPr lang="en-US" sz="3137" dirty="0"/>
-              <a:t/>
-            </a:r>
-            <a:br>
-              <a:rPr lang="en-US" sz="3137" dirty="0"/>
-            </a:br>
-            <a:endParaRPr lang="en-US" sz="3137" dirty="0"/>
-          </a:p>
-        </p:txBody>
-      </p:sp>
-      <p:sp>
-        <p:nvSpPr>
-          <p:cNvPr id="3" name="Text Placeholder 2"/>
-          <p:cNvSpPr>
-            <a:spLocks noGrp="1"/>
-          </p:cNvSpPr>
-          <p:nvPr>
-            <p:ph type="body" sz="quarter" idx="14"/>
-          </p:nvPr>
-        </p:nvSpPr>
-        <p:spPr/>
-        <p:txBody>
-          <a:bodyPr/>
-          <a:lstStyle/>
-          <a:p>
-            <a:r>
-              <a:rPr lang="en-US" spc="-98" dirty="0" err="1">
-                <a:ln w="3175">
-                  <a:noFill/>
-                </a:ln>
-                <a:solidFill>
-                  <a:srgbClr val="FFC000"/>
-                </a:solidFill>
-                <a:cs typeface="Segoe UI" pitchFamily="34" charset="0"/>
-              </a:rPr>
-              <a:t>Xamarin</a:t>
-            </a:r>
-            <a:r>
-              <a:rPr lang="en-US" spc="-98" dirty="0">
-                <a:ln w="3175">
-                  <a:noFill/>
-                </a:ln>
-                <a:solidFill>
-                  <a:srgbClr val="FFC000"/>
-                </a:solidFill>
-                <a:cs typeface="Segoe UI" pitchFamily="34" charset="0"/>
-              </a:rPr>
-              <a:t>:</a:t>
-            </a:r>
-          </a:p>
-          <a:p>
-            <a:r>
-              <a:rPr lang="en-US" dirty="0" smtClean="0"/>
-              <a:t>Write Native Mobile Apps </a:t>
-            </a:r>
-            <a:r>
-              <a:rPr lang="en-US" dirty="0"/>
-              <a:t>in C</a:t>
-            </a:r>
-            <a:r>
-              <a:rPr lang="en-US" dirty="0" smtClean="0"/>
-              <a:t>#</a:t>
-            </a:r>
-            <a:endParaRPr lang="en-US" spc="-98" dirty="0">
-              <a:ln w="3175">
-                <a:noFill/>
-              </a:ln>
+              <a:t>Xamarin.Android</a:t>
+            </a:r>
+            <a:endParaRPr lang="en-US" dirty="0">
               <a:solidFill>
                 <a:schemeClr val="bg1"/>
               </a:solidFill>
-              <a:cs typeface="Segoe UI" pitchFamily="34" charset="0"/>
             </a:endParaRPr>
           </a:p>
         </p:txBody>
@@ -29131,7 +29839,7 @@
     </p:spTree>
     <p:extLst>
       <p:ext uri="{BB962C8B-B14F-4D97-AF65-F5344CB8AC3E}">
-        <p14:creationId xmlns:p14="http://schemas.microsoft.com/office/powerpoint/2010/main" val="1225248859"/>
+        <p14:creationId xmlns:p14="http://schemas.microsoft.com/office/powerpoint/2010/main" val="487250150"/>
       </p:ext>
     </p:extLst>
   </p:cSld>
@@ -29140,16 +29848,281 @@
   </p:clrMapOvr>
   <mc:AlternateContent xmlns:mc="http://schemas.openxmlformats.org/markup-compatibility/2006" xmlns:p14="http://schemas.microsoft.com/office/powerpoint/2010/main">
     <mc:Choice Requires="p14">
-      <p:transition spd="slow" p14:dur="3400">
-        <p14:reveal/>
+      <p:transition spd="med" p14:dur="700">
+        <p:fade/>
       </p:transition>
     </mc:Choice>
     <mc:Fallback xmlns="">
-      <p:transition spd="slow">
+      <p:transition spd="med">
         <p:fade/>
       </p:transition>
     </mc:Fallback>
   </mc:AlternateContent>
+  <p:timing>
+    <p:tnLst>
+      <p:par>
+        <p:cTn id="1" dur="indefinite" restart="never" nodeType="tmRoot"/>
+      </p:par>
+    </p:tnLst>
+  </p:timing>
+</p:sld>
+</file>
+
+<file path=ppt/slides/slide28.xml><?xml version="1.0" encoding="utf-8"?>
+<p:sld xmlns:a="http://schemas.openxmlformats.org/drawingml/2006/main" xmlns:r="http://schemas.openxmlformats.org/officeDocument/2006/relationships" xmlns:p="http://schemas.openxmlformats.org/presentationml/2006/main">
+  <p:cSld>
+    <p:spTree>
+      <p:nvGrpSpPr>
+        <p:cNvPr id="1" name=""/>
+        <p:cNvGrpSpPr/>
+        <p:nvPr/>
+      </p:nvGrpSpPr>
+      <p:grpSpPr>
+        <a:xfrm>
+          <a:off x="0" y="0"/>
+          <a:ext cx="0" cy="0"/>
+          <a:chOff x="0" y="0"/>
+          <a:chExt cx="0" cy="0"/>
+        </a:xfrm>
+      </p:grpSpPr>
+      <p:sp>
+        <p:nvSpPr>
+          <p:cNvPr id="5" name="Title 4"/>
+          <p:cNvSpPr>
+            <a:spLocks noGrp="1"/>
+          </p:cNvSpPr>
+          <p:nvPr>
+            <p:ph type="ctrTitle"/>
+          </p:nvPr>
+        </p:nvSpPr>
+        <p:spPr/>
+        <p:txBody>
+          <a:bodyPr/>
+          <a:lstStyle/>
+          <a:p>
+            <a:r>
+              <a:rPr lang="en-US" smtClean="0"/>
+              <a:t>Demo</a:t>
+            </a:r>
+            <a:endParaRPr lang="en-US" dirty="0"/>
+          </a:p>
+        </p:txBody>
+      </p:sp>
+      <p:sp>
+        <p:nvSpPr>
+          <p:cNvPr id="4" name="Slide Number Placeholder 3"/>
+          <p:cNvSpPr>
+            <a:spLocks noGrp="1"/>
+          </p:cNvSpPr>
+          <p:nvPr>
+            <p:ph type="sldNum" sz="quarter" idx="4294967295"/>
+          </p:nvPr>
+        </p:nvSpPr>
+        <p:spPr>
+          <a:xfrm>
+            <a:off x="9448800" y="6256338"/>
+            <a:ext cx="2743200" cy="365125"/>
+          </a:xfrm>
+        </p:spPr>
+        <p:txBody>
+          <a:bodyPr/>
+          <a:lstStyle/>
+          <a:p>
+            <a:fld id="{0A164282-434E-41D4-9582-783D542A7B68}" type="slidenum">
+              <a:rPr lang="en-US" smtClean="0"/>
+              <a:pPr/>
+              <a:t>28</a:t>
+            </a:fld>
+            <a:endParaRPr lang="en-US"/>
+          </a:p>
+        </p:txBody>
+      </p:sp>
+      <p:sp>
+        <p:nvSpPr>
+          <p:cNvPr id="6" name="TextBox 5"/>
+          <p:cNvSpPr txBox="1"/>
+          <p:nvPr/>
+        </p:nvSpPr>
+        <p:spPr>
+          <a:xfrm>
+            <a:off x="698500" y="4575648"/>
+            <a:ext cx="10020300" cy="369332"/>
+          </a:xfrm>
+          <a:prstGeom prst="rect">
+            <a:avLst/>
+          </a:prstGeom>
+          <a:noFill/>
+        </p:spPr>
+        <p:txBody>
+          <a:bodyPr wrap="square" rtlCol="0">
+            <a:spAutoFit/>
+          </a:bodyPr>
+          <a:lstStyle/>
+          <a:p>
+            <a:r>
+              <a:rPr lang="en-US" dirty="0" smtClean="0">
+                <a:solidFill>
+                  <a:schemeClr val="bg1"/>
+                </a:solidFill>
+              </a:rPr>
+              <a:t>Share Common Codebase Across Android, iOS, and Windows Phone</a:t>
+            </a:r>
+            <a:endParaRPr lang="en-US" dirty="0">
+              <a:solidFill>
+                <a:schemeClr val="bg1"/>
+              </a:solidFill>
+            </a:endParaRPr>
+          </a:p>
+        </p:txBody>
+      </p:sp>
+    </p:spTree>
+    <p:extLst>
+      <p:ext uri="{BB962C8B-B14F-4D97-AF65-F5344CB8AC3E}">
+        <p14:creationId xmlns:p14="http://schemas.microsoft.com/office/powerpoint/2010/main" val="246638531"/>
+      </p:ext>
+    </p:extLst>
+  </p:cSld>
+  <p:clrMapOvr>
+    <a:masterClrMapping/>
+  </p:clrMapOvr>
+  <mc:AlternateContent xmlns:mc="http://schemas.openxmlformats.org/markup-compatibility/2006" xmlns:p14="http://schemas.microsoft.com/office/powerpoint/2010/main">
+    <mc:Choice Requires="p14">
+      <p:transition spd="med" p14:dur="700">
+        <p:fade/>
+      </p:transition>
+    </mc:Choice>
+    <mc:Fallback xmlns="">
+      <p:transition spd="med">
+        <p:fade/>
+      </p:transition>
+    </mc:Fallback>
+  </mc:AlternateContent>
+  <p:timing>
+    <p:tnLst>
+      <p:par>
+        <p:cTn id="1" dur="indefinite" restart="never" nodeType="tmRoot"/>
+      </p:par>
+    </p:tnLst>
+  </p:timing>
+</p:sld>
+</file>
+
+<file path=ppt/slides/slide29.xml><?xml version="1.0" encoding="utf-8"?>
+<p:sld xmlns:a="http://schemas.openxmlformats.org/drawingml/2006/main" xmlns:r="http://schemas.openxmlformats.org/officeDocument/2006/relationships" xmlns:p="http://schemas.openxmlformats.org/presentationml/2006/main">
+  <p:cSld>
+    <p:spTree>
+      <p:nvGrpSpPr>
+        <p:cNvPr id="1" name=""/>
+        <p:cNvGrpSpPr/>
+        <p:nvPr/>
+      </p:nvGrpSpPr>
+      <p:grpSpPr>
+        <a:xfrm>
+          <a:off x="0" y="0"/>
+          <a:ext cx="0" cy="0"/>
+          <a:chOff x="0" y="0"/>
+          <a:chExt cx="0" cy="0"/>
+        </a:xfrm>
+      </p:grpSpPr>
+      <p:sp>
+        <p:nvSpPr>
+          <p:cNvPr id="4" name="Text Placeholder 3"/>
+          <p:cNvSpPr>
+            <a:spLocks noGrp="1"/>
+          </p:cNvSpPr>
+          <p:nvPr>
+            <p:ph type="body" sz="quarter" idx="10"/>
+          </p:nvPr>
+        </p:nvSpPr>
+        <p:spPr>
+          <a:xfrm>
+            <a:off x="269239" y="1189177"/>
+            <a:ext cx="11653523" cy="5373651"/>
+          </a:xfrm>
+        </p:spPr>
+        <p:txBody>
+          <a:bodyPr/>
+          <a:lstStyle/>
+          <a:p>
+            <a:r>
+              <a:rPr lang="en-US"/>
+              <a:t>Emulators are fragile</a:t>
+            </a:r>
+          </a:p>
+          <a:p>
+            <a:r>
+              <a:rPr lang="en-US"/>
+              <a:t>Always rebuild all</a:t>
+            </a:r>
+          </a:p>
+          <a:p>
+            <a:r>
+              <a:rPr lang="en-US"/>
+              <a:t>Bad references cause mysterious errors</a:t>
+            </a:r>
+          </a:p>
+          <a:p>
+            <a:r>
+              <a:rPr lang="en-US"/>
+              <a:t>Get to know Nunit-Lite</a:t>
+            </a:r>
+          </a:p>
+          <a:p>
+            <a:endParaRPr lang="en-US"/>
+          </a:p>
+          <a:p>
+            <a:endParaRPr lang="en-US"/>
+          </a:p>
+          <a:p>
+            <a:endParaRPr lang="en-US"/>
+          </a:p>
+          <a:p>
+            <a:endParaRPr lang="en-US"/>
+          </a:p>
+        </p:txBody>
+      </p:sp>
+      <p:sp>
+        <p:nvSpPr>
+          <p:cNvPr id="2" name="Title 1"/>
+          <p:cNvSpPr>
+            <a:spLocks noGrp="1"/>
+          </p:cNvSpPr>
+          <p:nvPr>
+            <p:ph type="title"/>
+          </p:nvPr>
+        </p:nvSpPr>
+        <p:spPr/>
+        <p:txBody>
+          <a:bodyPr/>
+          <a:lstStyle/>
+          <a:p>
+            <a:r>
+              <a:rPr lang="en-US"/>
+              <a:t>Issues</a:t>
+            </a:r>
+          </a:p>
+        </p:txBody>
+      </p:sp>
+    </p:spTree>
+    <p:extLst>
+      <p:ext uri="{BB962C8B-B14F-4D97-AF65-F5344CB8AC3E}">
+        <p14:creationId xmlns:p14="http://schemas.microsoft.com/office/powerpoint/2010/main" val="3645307102"/>
+      </p:ext>
+    </p:extLst>
+  </p:cSld>
+  <p:clrMapOvr>
+    <a:masterClrMapping/>
+  </p:clrMapOvr>
+  <p:transition>
+    <p:fade/>
+  </p:transition>
+  <p:timing>
+    <p:tnLst>
+      <p:par>
+        <p:cTn id="1" dur="indefinite" restart="never" nodeType="tmRoot"/>
+      </p:par>
+    </p:tnLst>
+  </p:timing>
 </p:sld>
 </file>
 
@@ -29267,6 +30240,459 @@
 </p:sld>
 </file>
 
+<file path=ppt/slides/slide30.xml><?xml version="1.0" encoding="utf-8"?>
+<p:sld xmlns:a="http://schemas.openxmlformats.org/drawingml/2006/main" xmlns:r="http://schemas.openxmlformats.org/officeDocument/2006/relationships" xmlns:p="http://schemas.openxmlformats.org/presentationml/2006/main">
+  <p:cSld>
+    <p:spTree>
+      <p:nvGrpSpPr>
+        <p:cNvPr id="1" name=""/>
+        <p:cNvGrpSpPr/>
+        <p:nvPr/>
+      </p:nvGrpSpPr>
+      <p:grpSpPr>
+        <a:xfrm>
+          <a:off x="0" y="0"/>
+          <a:ext cx="0" cy="0"/>
+          <a:chOff x="0" y="0"/>
+          <a:chExt cx="0" cy="0"/>
+        </a:xfrm>
+      </p:grpSpPr>
+      <p:sp>
+        <p:nvSpPr>
+          <p:cNvPr id="9" name="Title 8"/>
+          <p:cNvSpPr>
+            <a:spLocks noGrp="1"/>
+          </p:cNvSpPr>
+          <p:nvPr>
+            <p:ph type="title"/>
+          </p:nvPr>
+        </p:nvSpPr>
+        <p:spPr/>
+        <p:txBody>
+          <a:bodyPr>
+            <a:normAutofit fontScale="90000"/>
+          </a:bodyPr>
+          <a:lstStyle/>
+          <a:p>
+            <a:r>
+              <a:rPr lang="en-US" dirty="0" smtClean="0">
+                <a:solidFill>
+                  <a:schemeClr val="bg1"/>
+                </a:solidFill>
+              </a:rPr>
+              <a:t>Thank You!</a:t>
+            </a:r>
+            <a:endParaRPr lang="en-US" dirty="0">
+              <a:solidFill>
+                <a:schemeClr val="bg1"/>
+              </a:solidFill>
+            </a:endParaRPr>
+          </a:p>
+        </p:txBody>
+      </p:sp>
+      <p:sp>
+        <p:nvSpPr>
+          <p:cNvPr id="12" name="TextBox 11"/>
+          <p:cNvSpPr txBox="1"/>
+          <p:nvPr/>
+        </p:nvSpPr>
+        <p:spPr>
+          <a:xfrm>
+            <a:off x="603891" y="2541655"/>
+            <a:ext cx="10982632" cy="1446550"/>
+          </a:xfrm>
+          <a:prstGeom prst="rect">
+            <a:avLst/>
+          </a:prstGeom>
+          <a:noFill/>
+        </p:spPr>
+        <p:txBody>
+          <a:bodyPr wrap="square" rtlCol="0">
+            <a:spAutoFit/>
+          </a:bodyPr>
+          <a:lstStyle/>
+          <a:p>
+            <a:pPr algn="ctr"/>
+            <a:r>
+              <a:rPr lang="en-US" sz="3200" dirty="0" smtClean="0">
+                <a:solidFill>
+                  <a:schemeClr val="bg1"/>
+                </a:solidFill>
+              </a:rPr>
+              <a:t>Ken LeFebvre</a:t>
+            </a:r>
+            <a:endParaRPr lang="en-US" sz="3200" dirty="0">
+              <a:solidFill>
+                <a:schemeClr val="bg1"/>
+              </a:solidFill>
+            </a:endParaRPr>
+          </a:p>
+          <a:p>
+            <a:pPr algn="ctr"/>
+            <a:r>
+              <a:rPr lang="en-US" sz="2800" dirty="0" smtClean="0">
+                <a:solidFill>
+                  <a:schemeClr val="bg1"/>
+                </a:solidFill>
+              </a:rPr>
+              <a:t>@</a:t>
+            </a:r>
+            <a:r>
+              <a:rPr lang="en-US" sz="2800" dirty="0" err="1" smtClean="0">
+                <a:solidFill>
+                  <a:schemeClr val="bg1"/>
+                </a:solidFill>
+              </a:rPr>
+              <a:t>kenlefeb</a:t>
+            </a:r>
+            <a:r>
+              <a:rPr lang="en-US" sz="2800" dirty="0" smtClean="0">
+                <a:solidFill>
+                  <a:schemeClr val="bg1"/>
+                </a:solidFill>
+              </a:rPr>
+              <a:t> | linkedin.com/</a:t>
+            </a:r>
+            <a:r>
+              <a:rPr lang="en-US" sz="2800" dirty="0" err="1" smtClean="0">
+                <a:solidFill>
+                  <a:schemeClr val="bg1"/>
+                </a:solidFill>
+              </a:rPr>
+              <a:t>kenlefeb</a:t>
+            </a:r>
+            <a:endParaRPr lang="en-US" sz="2800" dirty="0">
+              <a:solidFill>
+                <a:schemeClr val="bg1"/>
+              </a:solidFill>
+            </a:endParaRPr>
+          </a:p>
+          <a:p>
+            <a:pPr algn="ctr"/>
+            <a:r>
+              <a:rPr lang="en-US" sz="2800" dirty="0" smtClean="0">
+                <a:solidFill>
+                  <a:schemeClr val="bg1"/>
+                </a:solidFill>
+              </a:rPr>
+              <a:t>klefebvre@macropoint.com | www.macropoint.com</a:t>
+            </a:r>
+            <a:endParaRPr lang="en-US" sz="2800" dirty="0">
+              <a:solidFill>
+                <a:schemeClr val="bg1"/>
+              </a:solidFill>
+            </a:endParaRPr>
+          </a:p>
+        </p:txBody>
+      </p:sp>
+    </p:spTree>
+    <p:extLst>
+      <p:ext uri="{BB962C8B-B14F-4D97-AF65-F5344CB8AC3E}">
+        <p14:creationId xmlns:p14="http://schemas.microsoft.com/office/powerpoint/2010/main" val="3478655370"/>
+      </p:ext>
+    </p:extLst>
+  </p:cSld>
+  <p:clrMapOvr>
+    <a:masterClrMapping/>
+  </p:clrMapOvr>
+  <mc:AlternateContent xmlns:mc="http://schemas.openxmlformats.org/markup-compatibility/2006" xmlns:p14="http://schemas.microsoft.com/office/powerpoint/2010/main">
+    <mc:Choice Requires="p14">
+      <p:transition spd="med" p14:dur="700">
+        <p:fade/>
+      </p:transition>
+    </mc:Choice>
+    <mc:Fallback xmlns="">
+      <p:transition spd="med">
+        <p:fade/>
+      </p:transition>
+    </mc:Fallback>
+  </mc:AlternateContent>
+  <p:timing>
+    <p:tnLst>
+      <p:par>
+        <p:cTn id="1" dur="indefinite" restart="never" nodeType="tmRoot"/>
+      </p:par>
+    </p:tnLst>
+  </p:timing>
+</p:sld>
+</file>
+
+<file path=ppt/slides/slide31.xml><?xml version="1.0" encoding="utf-8"?>
+<p:sld xmlns:a="http://schemas.openxmlformats.org/drawingml/2006/main" xmlns:r="http://schemas.openxmlformats.org/officeDocument/2006/relationships" xmlns:p="http://schemas.openxmlformats.org/presentationml/2006/main">
+  <p:cSld>
+    <p:spTree>
+      <p:nvGrpSpPr>
+        <p:cNvPr id="1" name=""/>
+        <p:cNvGrpSpPr/>
+        <p:nvPr/>
+      </p:nvGrpSpPr>
+      <p:grpSpPr>
+        <a:xfrm>
+          <a:off x="0" y="0"/>
+          <a:ext cx="0" cy="0"/>
+          <a:chOff x="0" y="0"/>
+          <a:chExt cx="0" cy="0"/>
+        </a:xfrm>
+      </p:grpSpPr>
+      <p:sp>
+        <p:nvSpPr>
+          <p:cNvPr id="2" name="Title 1"/>
+          <p:cNvSpPr>
+            <a:spLocks noGrp="1"/>
+          </p:cNvSpPr>
+          <p:nvPr>
+            <p:ph type="title"/>
+          </p:nvPr>
+        </p:nvSpPr>
+        <p:spPr/>
+        <p:txBody>
+          <a:bodyPr/>
+          <a:lstStyle/>
+          <a:p>
+            <a:pPr>
+              <a:spcBef>
+                <a:spcPts val="0"/>
+              </a:spcBef>
+              <a:buClr>
+                <a:srgbClr val="505050"/>
+              </a:buClr>
+              <a:buSzPct val="90000"/>
+            </a:pPr>
+            <a:r>
+              <a:rPr lang="en-US" dirty="0" smtClean="0"/>
+              <a:t>July .NET SIG</a:t>
+            </a:r>
+            <a:br>
+              <a:rPr lang="en-US" dirty="0" smtClean="0"/>
+            </a:br>
+            <a:r>
+              <a:rPr lang="en-US" sz="3137" dirty="0" smtClean="0">
+                <a:solidFill>
+                  <a:srgbClr val="FFC000"/>
+                </a:solidFill>
+              </a:rPr>
+              <a:t>7/14/2015</a:t>
+            </a:r>
+            <a:r>
+              <a:rPr lang="en-US" sz="3137" dirty="0"/>
+              <a:t/>
+            </a:r>
+            <a:br>
+              <a:rPr lang="en-US" sz="3137" dirty="0"/>
+            </a:br>
+            <a:r>
+              <a:rPr lang="en-US" sz="2353" spc="0" dirty="0" smtClean="0">
+                <a:ln>
+                  <a:noFill/>
+                </a:ln>
+                <a:gradFill>
+                  <a:gsLst>
+                    <a:gs pos="1250">
+                      <a:srgbClr val="FFFFFF"/>
+                    </a:gs>
+                    <a:gs pos="99000">
+                      <a:srgbClr val="FFFFFF"/>
+                    </a:gs>
+                  </a:gsLst>
+                  <a:lin ang="5400000" scaled="0"/>
+                </a:gradFill>
+                <a:cs typeface="+mn-cs"/>
+              </a:rPr>
+              <a:t>Rich </a:t>
+            </a:r>
+            <a:r>
+              <a:rPr lang="en-US" sz="2353" spc="0" dirty="0" err="1" smtClean="0">
+                <a:ln>
+                  <a:noFill/>
+                </a:ln>
+                <a:gradFill>
+                  <a:gsLst>
+                    <a:gs pos="1250">
+                      <a:srgbClr val="FFFFFF"/>
+                    </a:gs>
+                    <a:gs pos="99000">
+                      <a:srgbClr val="FFFFFF"/>
+                    </a:gs>
+                  </a:gsLst>
+                  <a:lin ang="5400000" scaled="0"/>
+                </a:gradFill>
+                <a:cs typeface="+mn-cs"/>
+              </a:rPr>
+              <a:t>Deken</a:t>
+            </a:r>
+            <a:r>
+              <a:rPr lang="en-US" sz="2353" spc="0" dirty="0">
+                <a:ln>
+                  <a:noFill/>
+                </a:ln>
+                <a:gradFill>
+                  <a:gsLst>
+                    <a:gs pos="1250">
+                      <a:srgbClr val="FFFFFF"/>
+                    </a:gs>
+                    <a:gs pos="99000">
+                      <a:srgbClr val="FFFFFF"/>
+                    </a:gs>
+                  </a:gsLst>
+                  <a:lin ang="5400000" scaled="0"/>
+                </a:gradFill>
+                <a:cs typeface="+mn-cs"/>
+              </a:rPr>
+              <a:t/>
+            </a:r>
+            <a:br>
+              <a:rPr lang="en-US" sz="2353" spc="0" dirty="0">
+                <a:ln>
+                  <a:noFill/>
+                </a:ln>
+                <a:gradFill>
+                  <a:gsLst>
+                    <a:gs pos="1250">
+                      <a:srgbClr val="FFFFFF"/>
+                    </a:gs>
+                    <a:gs pos="99000">
+                      <a:srgbClr val="FFFFFF"/>
+                    </a:gs>
+                  </a:gsLst>
+                  <a:lin ang="5400000" scaled="0"/>
+                </a:gradFill>
+                <a:cs typeface="+mn-cs"/>
+              </a:rPr>
+            </a:br>
+            <a:r>
+              <a:rPr lang="en-US" sz="1176" spc="0" dirty="0" smtClean="0">
+                <a:ln>
+                  <a:noFill/>
+                </a:ln>
+                <a:gradFill>
+                  <a:gsLst>
+                    <a:gs pos="1250">
+                      <a:srgbClr val="FFFFFF"/>
+                    </a:gs>
+                    <a:gs pos="99000">
+                      <a:srgbClr val="FFFFFF"/>
+                    </a:gs>
+                  </a:gsLst>
+                  <a:lin ang="5400000" scaled="0"/>
+                </a:gradFill>
+                <a:cs typeface="+mn-cs"/>
+              </a:rPr>
+              <a:t>Bennett Adelson</a:t>
+            </a:r>
+            <a:r>
+              <a:rPr lang="en-US" sz="1176" spc="0" dirty="0">
+                <a:ln>
+                  <a:noFill/>
+                </a:ln>
+                <a:gradFill>
+                  <a:gsLst>
+                    <a:gs pos="1250">
+                      <a:srgbClr val="FFFFFF"/>
+                    </a:gs>
+                    <a:gs pos="99000">
+                      <a:srgbClr val="FFFFFF"/>
+                    </a:gs>
+                  </a:gsLst>
+                  <a:lin ang="5400000" scaled="0"/>
+                </a:gradFill>
+                <a:cs typeface="+mn-cs"/>
+              </a:rPr>
+              <a:t/>
+            </a:r>
+            <a:br>
+              <a:rPr lang="en-US" sz="1176" spc="0" dirty="0">
+                <a:ln>
+                  <a:noFill/>
+                </a:ln>
+                <a:gradFill>
+                  <a:gsLst>
+                    <a:gs pos="1250">
+                      <a:srgbClr val="FFFFFF"/>
+                    </a:gs>
+                    <a:gs pos="99000">
+                      <a:srgbClr val="FFFFFF"/>
+                    </a:gs>
+                  </a:gsLst>
+                  <a:lin ang="5400000" scaled="0"/>
+                </a:gradFill>
+                <a:cs typeface="+mn-cs"/>
+              </a:rPr>
+            </a:br>
+            <a:r>
+              <a:rPr lang="en-US" sz="3137" dirty="0"/>
+              <a:t/>
+            </a:r>
+            <a:br>
+              <a:rPr lang="en-US" sz="3137" dirty="0"/>
+            </a:br>
+            <a:endParaRPr lang="en-US" sz="3137" dirty="0"/>
+          </a:p>
+        </p:txBody>
+      </p:sp>
+      <p:sp>
+        <p:nvSpPr>
+          <p:cNvPr id="3" name="Text Placeholder 2"/>
+          <p:cNvSpPr>
+            <a:spLocks noGrp="1"/>
+          </p:cNvSpPr>
+          <p:nvPr>
+            <p:ph type="body" sz="quarter" idx="14"/>
+          </p:nvPr>
+        </p:nvSpPr>
+        <p:spPr/>
+        <p:txBody>
+          <a:bodyPr/>
+          <a:lstStyle/>
+          <a:p>
+            <a:r>
+              <a:rPr lang="en-US" spc="-98" dirty="0" smtClean="0">
+                <a:ln w="3175">
+                  <a:noFill/>
+                </a:ln>
+                <a:solidFill>
+                  <a:srgbClr val="FFC000"/>
+                </a:solidFill>
+                <a:cs typeface="Segoe UI" pitchFamily="34" charset="0"/>
+              </a:rPr>
+              <a:t>Microsoft Stream Analytics</a:t>
+            </a:r>
+            <a:endParaRPr lang="en-US" spc="-98" dirty="0">
+              <a:ln w="3175">
+                <a:noFill/>
+              </a:ln>
+              <a:solidFill>
+                <a:schemeClr val="bg1"/>
+              </a:solidFill>
+              <a:cs typeface="Segoe UI" pitchFamily="34" charset="0"/>
+            </a:endParaRPr>
+          </a:p>
+        </p:txBody>
+      </p:sp>
+    </p:spTree>
+    <p:extLst>
+      <p:ext uri="{BB962C8B-B14F-4D97-AF65-F5344CB8AC3E}">
+        <p14:creationId xmlns:p14="http://schemas.microsoft.com/office/powerpoint/2010/main" val="1225248859"/>
+      </p:ext>
+    </p:extLst>
+  </p:cSld>
+  <p:clrMapOvr>
+    <a:masterClrMapping/>
+  </p:clrMapOvr>
+  <mc:AlternateContent xmlns:mc="http://schemas.openxmlformats.org/markup-compatibility/2006" xmlns:p14="http://schemas.microsoft.com/office/powerpoint/2010/main">
+    <mc:Choice Requires="p14">
+      <p:transition spd="slow" p14:dur="3400">
+        <p14:reveal/>
+      </p:transition>
+    </mc:Choice>
+    <mc:Fallback xmlns="">
+      <p:transition spd="slow">
+        <p:fade/>
+      </p:transition>
+    </mc:Fallback>
+  </mc:AlternateContent>
+</p:sld>
+</file>
+
 <file path=ppt/slides/slide4.xml><?xml version="1.0" encoding="utf-8"?>
 <p:sld xmlns:a="http://schemas.openxmlformats.org/drawingml/2006/main" xmlns:r="http://schemas.openxmlformats.org/officeDocument/2006/relationships" xmlns:p="http://schemas.openxmlformats.org/presentationml/2006/main">
   <p:cSld>
@@ -29430,6 +30856,13 @@
       </p:transition>
     </mc:Fallback>
   </mc:AlternateContent>
+  <p:timing>
+    <p:tnLst>
+      <p:par>
+        <p:cTn id="1" dur="indefinite" restart="never" nodeType="tmRoot"/>
+      </p:par>
+    </p:tnLst>
+  </p:timing>
 </p:sld>
 </file>
 
@@ -29612,6 +31045,13 @@
       </p:transition>
     </mc:Fallback>
   </mc:AlternateContent>
+  <p:timing>
+    <p:tnLst>
+      <p:par>
+        <p:cTn id="1" dur="indefinite" restart="never" nodeType="tmRoot"/>
+      </p:par>
+    </p:tnLst>
+  </p:timing>
 </p:sld>
 </file>
 
@@ -29786,6 +31226,13 @@
       </p:transition>
     </mc:Fallback>
   </mc:AlternateContent>
+  <p:timing>
+    <p:tnLst>
+      <p:par>
+        <p:cTn id="1" dur="indefinite" restart="never" nodeType="tmRoot"/>
+      </p:par>
+    </p:tnLst>
+  </p:timing>
 </p:sld>
 </file>
 
@@ -29968,6 +31415,13 @@
       </p:transition>
     </mc:Fallback>
   </mc:AlternateContent>
+  <p:timing>
+    <p:tnLst>
+      <p:par>
+        <p:cTn id="1" dur="indefinite" restart="never" nodeType="tmRoot"/>
+      </p:par>
+    </p:tnLst>
+  </p:timing>
 </p:sld>
 </file>
 
@@ -30142,6 +31596,13 @@
       </p:transition>
     </mc:Fallback>
   </mc:AlternateContent>
+  <p:timing>
+    <p:tnLst>
+      <p:par>
+        <p:cTn id="1" dur="indefinite" restart="never" nodeType="tmRoot"/>
+      </p:par>
+    </p:tnLst>
+  </p:timing>
 </p:sld>
 </file>
 
@@ -30316,6 +31777,13 @@
       </p:transition>
     </mc:Fallback>
   </mc:AlternateContent>
+  <p:timing>
+    <p:tnLst>
+      <p:par>
+        <p:cTn id="1" dur="indefinite" restart="never" nodeType="tmRoot"/>
+      </p:par>
+    </p:tnLst>
+  </p:timing>
 </p:sld>
 </file>
 

</xml_diff>